<commit_message>
Added the burn down chart to the presentation
</commit_message>
<xml_diff>
--- a/demos/Demo 2 - COEUS.pptx
+++ b/demos/Demo 2 - COEUS.pptx
@@ -7,6 +7,12 @@
   <p:sldIdLst>
     <p:sldId id="256" r:id="rId2"/>
     <p:sldId id="292" r:id="rId3"/>
+    <p:sldId id="295" r:id="rId4"/>
+    <p:sldId id="293" r:id="rId5"/>
+    <p:sldId id="298" r:id="rId6"/>
+    <p:sldId id="294" r:id="rId7"/>
+    <p:sldId id="296" r:id="rId8"/>
+    <p:sldId id="297" r:id="rId9"/>
   </p:sldIdLst>
   <p:sldSz cx="9144000" cy="6858000" type="screen4x3"/>
   <p:notesSz cx="6858000" cy="9144000"/>
@@ -112,6 +118,12 @@
           <p14:sldIdLst>
             <p14:sldId id="256"/>
             <p14:sldId id="292"/>
+            <p14:sldId id="295"/>
+            <p14:sldId id="293"/>
+            <p14:sldId id="298"/>
+            <p14:sldId id="294"/>
+            <p14:sldId id="296"/>
+            <p14:sldId id="297"/>
           </p14:sldIdLst>
         </p14:section>
         <p14:section name="Background" id="{716D4479-2F61-4D2A-9408-7C63530D3698}">
@@ -132,7 +144,7 @@
       </p14:sectionLst>
     </p:ext>
     <p:ext uri="{EFAFB233-063F-42B5-8137-9DF3F51BA10A}">
-      <p15:sldGuideLst xmlns:p15="http://schemas.microsoft.com/office/powerpoint/2012/main" xmlns="">
+      <p15:sldGuideLst xmlns:p15="http://schemas.microsoft.com/office/powerpoint/2012/main">
         <p15:guide id="1" orient="horz" pos="2160">
           <p15:clr>
             <a:srgbClr val="A4A3A4"/>
@@ -147,6 +159,1144 @@
     </p:ext>
   </p:extLst>
 </p:presentation>
+</file>
+
+<file path=ppt/charts/chart1.xml><?xml version="1.0" encoding="utf-8"?>
+<c:chartSpace xmlns:c="http://schemas.openxmlformats.org/drawingml/2006/chart" xmlns:a="http://schemas.openxmlformats.org/drawingml/2006/main" xmlns:r="http://schemas.openxmlformats.org/officeDocument/2006/relationships">
+  <c:date1904 val="0"/>
+  <c:lang val="en-US"/>
+  <c:roundedCorners val="0"/>
+  <mc:AlternateContent xmlns:mc="http://schemas.openxmlformats.org/markup-compatibility/2006">
+    <mc:Choice xmlns:c14="http://schemas.microsoft.com/office/drawing/2007/8/2/chart" Requires="c14">
+      <c14:style val="102"/>
+    </mc:Choice>
+    <mc:Fallback>
+      <c:style val="2"/>
+    </mc:Fallback>
+  </mc:AlternateContent>
+  <c:chart>
+    <c:title>
+      <c:tx>
+        <c:rich>
+          <a:bodyPr rot="0" spcFirstLastPara="1" vertOverflow="ellipsis" vert="horz" wrap="square" anchor="ctr" anchorCtr="1"/>
+          <a:lstStyle/>
+          <a:p>
+            <a:pPr>
+              <a:defRPr sz="1400" b="0" i="0" u="none" strike="noStrike" kern="1200" spc="0" baseline="0">
+                <a:solidFill>
+                  <a:schemeClr val="tx1">
+                    <a:lumMod val="65000"/>
+                    <a:lumOff val="35000"/>
+                  </a:schemeClr>
+                </a:solidFill>
+                <a:latin typeface="+mn-lt"/>
+                <a:ea typeface="+mn-ea"/>
+                <a:cs typeface="+mn-cs"/>
+              </a:defRPr>
+            </a:pPr>
+            <a:r>
+              <a:rPr lang="en-ZA"/>
+              <a:t>Sprint no.1 Burn-down</a:t>
+            </a:r>
+          </a:p>
+        </c:rich>
+      </c:tx>
+      <c:layout/>
+      <c:overlay val="0"/>
+      <c:spPr>
+        <a:noFill/>
+        <a:ln>
+          <a:noFill/>
+        </a:ln>
+        <a:effectLst/>
+      </c:spPr>
+      <c:txPr>
+        <a:bodyPr rot="0" spcFirstLastPara="1" vertOverflow="ellipsis" vert="horz" wrap="square" anchor="ctr" anchorCtr="1"/>
+        <a:lstStyle/>
+        <a:p>
+          <a:pPr>
+            <a:defRPr sz="1400" b="0" i="0" u="none" strike="noStrike" kern="1200" spc="0" baseline="0">
+              <a:solidFill>
+                <a:schemeClr val="tx1">
+                  <a:lumMod val="65000"/>
+                  <a:lumOff val="35000"/>
+                </a:schemeClr>
+              </a:solidFill>
+              <a:latin typeface="+mn-lt"/>
+              <a:ea typeface="+mn-ea"/>
+              <a:cs typeface="+mn-cs"/>
+            </a:defRPr>
+          </a:pPr>
+          <a:endParaRPr lang="en-US"/>
+        </a:p>
+      </c:txPr>
+    </c:title>
+    <c:autoTitleDeleted val="0"/>
+    <c:plotArea>
+      <c:layout/>
+      <c:lineChart>
+        <c:grouping val="standard"/>
+        <c:varyColors val="0"/>
+        <c:ser>
+          <c:idx val="0"/>
+          <c:order val="0"/>
+          <c:tx>
+            <c:strRef>
+              <c:f>Sheet1!$C$23</c:f>
+              <c:strCache>
+                <c:ptCount val="1"/>
+                <c:pt idx="0">
+                  <c:v>Actual Remaining Hours</c:v>
+                </c:pt>
+              </c:strCache>
+            </c:strRef>
+          </c:tx>
+          <c:spPr>
+            <a:ln w="28575" cap="rnd">
+              <a:solidFill>
+                <a:schemeClr val="accent1"/>
+              </a:solidFill>
+              <a:round/>
+            </a:ln>
+            <a:effectLst/>
+          </c:spPr>
+          <c:marker>
+            <c:symbol val="none"/>
+          </c:marker>
+          <c:cat>
+            <c:strRef>
+              <c:f>Sheet1!$E$3:$R$3</c:f>
+              <c:strCache>
+                <c:ptCount val="14"/>
+                <c:pt idx="0">
+                  <c:v>Day 1</c:v>
+                </c:pt>
+                <c:pt idx="1">
+                  <c:v>Day 2</c:v>
+                </c:pt>
+                <c:pt idx="2">
+                  <c:v>Day 3</c:v>
+                </c:pt>
+                <c:pt idx="3">
+                  <c:v>Day 4</c:v>
+                </c:pt>
+                <c:pt idx="4">
+                  <c:v>Day 5</c:v>
+                </c:pt>
+                <c:pt idx="5">
+                  <c:v>Day 6</c:v>
+                </c:pt>
+                <c:pt idx="6">
+                  <c:v>Day 7</c:v>
+                </c:pt>
+                <c:pt idx="7">
+                  <c:v>Day 8</c:v>
+                </c:pt>
+                <c:pt idx="8">
+                  <c:v>Day 9</c:v>
+                </c:pt>
+                <c:pt idx="9">
+                  <c:v>Day 10</c:v>
+                </c:pt>
+                <c:pt idx="10">
+                  <c:v>Day 11</c:v>
+                </c:pt>
+                <c:pt idx="11">
+                  <c:v>Day 12</c:v>
+                </c:pt>
+                <c:pt idx="12">
+                  <c:v>Day 13</c:v>
+                </c:pt>
+                <c:pt idx="13">
+                  <c:v>Day 14</c:v>
+                </c:pt>
+              </c:strCache>
+            </c:strRef>
+          </c:cat>
+          <c:val>
+            <c:numRef>
+              <c:f>Sheet1!$D$23:$R$23</c:f>
+              <c:numCache>
+                <c:formatCode>General</c:formatCode>
+                <c:ptCount val="15"/>
+                <c:pt idx="0">
+                  <c:v>95</c:v>
+                </c:pt>
+                <c:pt idx="1">
+                  <c:v>88</c:v>
+                </c:pt>
+                <c:pt idx="2">
+                  <c:v>83</c:v>
+                </c:pt>
+                <c:pt idx="3">
+                  <c:v>77</c:v>
+                </c:pt>
+                <c:pt idx="4">
+                  <c:v>71</c:v>
+                </c:pt>
+                <c:pt idx="5">
+                  <c:v>64</c:v>
+                </c:pt>
+                <c:pt idx="6">
+                  <c:v>56</c:v>
+                </c:pt>
+                <c:pt idx="7">
+                  <c:v>49</c:v>
+                </c:pt>
+                <c:pt idx="8">
+                  <c:v>38</c:v>
+                </c:pt>
+                <c:pt idx="9">
+                  <c:v>32</c:v>
+                </c:pt>
+                <c:pt idx="10">
+                  <c:v>20</c:v>
+                </c:pt>
+                <c:pt idx="11">
+                  <c:v>14</c:v>
+                </c:pt>
+                <c:pt idx="12">
+                  <c:v>9</c:v>
+                </c:pt>
+                <c:pt idx="13">
+                  <c:v>5</c:v>
+                </c:pt>
+                <c:pt idx="14">
+                  <c:v>1</c:v>
+                </c:pt>
+              </c:numCache>
+            </c:numRef>
+          </c:val>
+          <c:smooth val="0"/>
+        </c:ser>
+        <c:ser>
+          <c:idx val="1"/>
+          <c:order val="1"/>
+          <c:tx>
+            <c:strRef>
+              <c:f>Sheet1!$C$24</c:f>
+              <c:strCache>
+                <c:ptCount val="1"/>
+                <c:pt idx="0">
+                  <c:v>Estimated Remaining Hours</c:v>
+                </c:pt>
+              </c:strCache>
+            </c:strRef>
+          </c:tx>
+          <c:spPr>
+            <a:ln w="28575" cap="rnd">
+              <a:solidFill>
+                <a:schemeClr val="accent2"/>
+              </a:solidFill>
+              <a:round/>
+            </a:ln>
+            <a:effectLst/>
+          </c:spPr>
+          <c:marker>
+            <c:symbol val="none"/>
+          </c:marker>
+          <c:cat>
+            <c:strRef>
+              <c:f>Sheet1!$E$3:$R$3</c:f>
+              <c:strCache>
+                <c:ptCount val="14"/>
+                <c:pt idx="0">
+                  <c:v>Day 1</c:v>
+                </c:pt>
+                <c:pt idx="1">
+                  <c:v>Day 2</c:v>
+                </c:pt>
+                <c:pt idx="2">
+                  <c:v>Day 3</c:v>
+                </c:pt>
+                <c:pt idx="3">
+                  <c:v>Day 4</c:v>
+                </c:pt>
+                <c:pt idx="4">
+                  <c:v>Day 5</c:v>
+                </c:pt>
+                <c:pt idx="5">
+                  <c:v>Day 6</c:v>
+                </c:pt>
+                <c:pt idx="6">
+                  <c:v>Day 7</c:v>
+                </c:pt>
+                <c:pt idx="7">
+                  <c:v>Day 8</c:v>
+                </c:pt>
+                <c:pt idx="8">
+                  <c:v>Day 9</c:v>
+                </c:pt>
+                <c:pt idx="9">
+                  <c:v>Day 10</c:v>
+                </c:pt>
+                <c:pt idx="10">
+                  <c:v>Day 11</c:v>
+                </c:pt>
+                <c:pt idx="11">
+                  <c:v>Day 12</c:v>
+                </c:pt>
+                <c:pt idx="12">
+                  <c:v>Day 13</c:v>
+                </c:pt>
+                <c:pt idx="13">
+                  <c:v>Day 14</c:v>
+                </c:pt>
+              </c:strCache>
+            </c:strRef>
+          </c:cat>
+          <c:val>
+            <c:numRef>
+              <c:f>Sheet1!$D$24:$R$24</c:f>
+              <c:numCache>
+                <c:formatCode>General</c:formatCode>
+                <c:ptCount val="15"/>
+                <c:pt idx="0">
+                  <c:v>95</c:v>
+                </c:pt>
+                <c:pt idx="1">
+                  <c:v>88.214285714285708</c:v>
+                </c:pt>
+                <c:pt idx="2">
+                  <c:v>81.428571428571416</c:v>
+                </c:pt>
+                <c:pt idx="3">
+                  <c:v>74.642857142857125</c:v>
+                </c:pt>
+                <c:pt idx="4">
+                  <c:v>67.857142857142833</c:v>
+                </c:pt>
+                <c:pt idx="5">
+                  <c:v>61.071428571428548</c:v>
+                </c:pt>
+                <c:pt idx="6">
+                  <c:v>54.285714285714263</c:v>
+                </c:pt>
+                <c:pt idx="7">
+                  <c:v>47.499999999999979</c:v>
+                </c:pt>
+                <c:pt idx="8">
+                  <c:v>40.714285714285694</c:v>
+                </c:pt>
+                <c:pt idx="9">
+                  <c:v>33.928571428571409</c:v>
+                </c:pt>
+                <c:pt idx="10">
+                  <c:v>27.142857142857125</c:v>
+                </c:pt>
+                <c:pt idx="11">
+                  <c:v>20.35714285714284</c:v>
+                </c:pt>
+                <c:pt idx="12">
+                  <c:v>13.571428571428555</c:v>
+                </c:pt>
+                <c:pt idx="13">
+                  <c:v>6.7857142857142696</c:v>
+                </c:pt>
+                <c:pt idx="14">
+                  <c:v>-1.5987211554602254E-14</c:v>
+                </c:pt>
+              </c:numCache>
+            </c:numRef>
+          </c:val>
+          <c:smooth val="0"/>
+        </c:ser>
+        <c:dLbls>
+          <c:showLegendKey val="0"/>
+          <c:showVal val="0"/>
+          <c:showCatName val="0"/>
+          <c:showSerName val="0"/>
+          <c:showPercent val="0"/>
+          <c:showBubbleSize val="0"/>
+        </c:dLbls>
+        <c:smooth val="0"/>
+        <c:axId val="1043331808"/>
+        <c:axId val="1043335616"/>
+      </c:lineChart>
+      <c:catAx>
+        <c:axId val="1043331808"/>
+        <c:scaling>
+          <c:orientation val="minMax"/>
+        </c:scaling>
+        <c:delete val="0"/>
+        <c:axPos val="b"/>
+        <c:numFmt formatCode="General" sourceLinked="1"/>
+        <c:majorTickMark val="none"/>
+        <c:minorTickMark val="none"/>
+        <c:tickLblPos val="nextTo"/>
+        <c:spPr>
+          <a:noFill/>
+          <a:ln w="9525" cap="flat" cmpd="sng" algn="ctr">
+            <a:solidFill>
+              <a:schemeClr val="tx1">
+                <a:lumMod val="15000"/>
+                <a:lumOff val="85000"/>
+              </a:schemeClr>
+            </a:solidFill>
+            <a:round/>
+          </a:ln>
+          <a:effectLst/>
+        </c:spPr>
+        <c:txPr>
+          <a:bodyPr rot="-60000000" spcFirstLastPara="1" vertOverflow="ellipsis" vert="horz" wrap="square" anchor="ctr" anchorCtr="1"/>
+          <a:lstStyle/>
+          <a:p>
+            <a:pPr>
+              <a:defRPr sz="900" b="0" i="0" u="none" strike="noStrike" kern="1200" baseline="0">
+                <a:solidFill>
+                  <a:schemeClr val="tx1">
+                    <a:lumMod val="65000"/>
+                    <a:lumOff val="35000"/>
+                  </a:schemeClr>
+                </a:solidFill>
+                <a:latin typeface="+mn-lt"/>
+                <a:ea typeface="+mn-ea"/>
+                <a:cs typeface="+mn-cs"/>
+              </a:defRPr>
+            </a:pPr>
+            <a:endParaRPr lang="en-US"/>
+          </a:p>
+        </c:txPr>
+        <c:crossAx val="1043335616"/>
+        <c:crosses val="autoZero"/>
+        <c:auto val="1"/>
+        <c:lblAlgn val="ctr"/>
+        <c:lblOffset val="100"/>
+        <c:noMultiLvlLbl val="0"/>
+      </c:catAx>
+      <c:valAx>
+        <c:axId val="1043335616"/>
+        <c:scaling>
+          <c:orientation val="minMax"/>
+        </c:scaling>
+        <c:delete val="0"/>
+        <c:axPos val="l"/>
+        <c:majorGridlines>
+          <c:spPr>
+            <a:ln w="9525" cap="flat" cmpd="sng" algn="ctr">
+              <a:solidFill>
+                <a:schemeClr val="tx1">
+                  <a:lumMod val="15000"/>
+                  <a:lumOff val="85000"/>
+                </a:schemeClr>
+              </a:solidFill>
+              <a:round/>
+            </a:ln>
+            <a:effectLst/>
+          </c:spPr>
+        </c:majorGridlines>
+        <c:title>
+          <c:tx>
+            <c:rich>
+              <a:bodyPr rot="-5400000" spcFirstLastPara="1" vertOverflow="ellipsis" vert="horz" wrap="square" anchor="ctr" anchorCtr="1"/>
+              <a:lstStyle/>
+              <a:p>
+                <a:pPr>
+                  <a:defRPr sz="1000" b="0" i="0" u="none" strike="noStrike" kern="1200" baseline="0">
+                    <a:solidFill>
+                      <a:schemeClr val="tx1">
+                        <a:lumMod val="65000"/>
+                        <a:lumOff val="35000"/>
+                      </a:schemeClr>
+                    </a:solidFill>
+                    <a:latin typeface="+mn-lt"/>
+                    <a:ea typeface="+mn-ea"/>
+                    <a:cs typeface="+mn-cs"/>
+                  </a:defRPr>
+                </a:pPr>
+                <a:r>
+                  <a:rPr lang="en-ZA"/>
+                  <a:t>Time(hr)</a:t>
+                </a:r>
+              </a:p>
+            </c:rich>
+          </c:tx>
+          <c:layout/>
+          <c:overlay val="0"/>
+          <c:spPr>
+            <a:noFill/>
+            <a:ln>
+              <a:noFill/>
+            </a:ln>
+            <a:effectLst/>
+          </c:spPr>
+          <c:txPr>
+            <a:bodyPr rot="-5400000" spcFirstLastPara="1" vertOverflow="ellipsis" vert="horz" wrap="square" anchor="ctr" anchorCtr="1"/>
+            <a:lstStyle/>
+            <a:p>
+              <a:pPr>
+                <a:defRPr sz="1000" b="0" i="0" u="none" strike="noStrike" kern="1200" baseline="0">
+                  <a:solidFill>
+                    <a:schemeClr val="tx1">
+                      <a:lumMod val="65000"/>
+                      <a:lumOff val="35000"/>
+                    </a:schemeClr>
+                  </a:solidFill>
+                  <a:latin typeface="+mn-lt"/>
+                  <a:ea typeface="+mn-ea"/>
+                  <a:cs typeface="+mn-cs"/>
+                </a:defRPr>
+              </a:pPr>
+              <a:endParaRPr lang="en-US"/>
+            </a:p>
+          </c:txPr>
+        </c:title>
+        <c:numFmt formatCode="General" sourceLinked="1"/>
+        <c:majorTickMark val="none"/>
+        <c:minorTickMark val="none"/>
+        <c:tickLblPos val="nextTo"/>
+        <c:spPr>
+          <a:noFill/>
+          <a:ln>
+            <a:noFill/>
+          </a:ln>
+          <a:effectLst/>
+        </c:spPr>
+        <c:txPr>
+          <a:bodyPr rot="-60000000" spcFirstLastPara="1" vertOverflow="ellipsis" vert="horz" wrap="square" anchor="ctr" anchorCtr="1"/>
+          <a:lstStyle/>
+          <a:p>
+            <a:pPr>
+              <a:defRPr sz="900" b="0" i="0" u="none" strike="noStrike" kern="1200" baseline="0">
+                <a:solidFill>
+                  <a:schemeClr val="tx1">
+                    <a:lumMod val="65000"/>
+                    <a:lumOff val="35000"/>
+                  </a:schemeClr>
+                </a:solidFill>
+                <a:latin typeface="+mn-lt"/>
+                <a:ea typeface="+mn-ea"/>
+                <a:cs typeface="+mn-cs"/>
+              </a:defRPr>
+            </a:pPr>
+            <a:endParaRPr lang="en-US"/>
+          </a:p>
+        </c:txPr>
+        <c:crossAx val="1043331808"/>
+        <c:crosses val="autoZero"/>
+        <c:crossBetween val="between"/>
+      </c:valAx>
+      <c:spPr>
+        <a:noFill/>
+        <a:ln>
+          <a:noFill/>
+        </a:ln>
+        <a:effectLst/>
+      </c:spPr>
+    </c:plotArea>
+    <c:legend>
+      <c:legendPos val="b"/>
+      <c:layout/>
+      <c:overlay val="0"/>
+      <c:spPr>
+        <a:noFill/>
+        <a:ln>
+          <a:noFill/>
+        </a:ln>
+        <a:effectLst/>
+      </c:spPr>
+      <c:txPr>
+        <a:bodyPr rot="0" spcFirstLastPara="1" vertOverflow="ellipsis" vert="horz" wrap="square" anchor="ctr" anchorCtr="1"/>
+        <a:lstStyle/>
+        <a:p>
+          <a:pPr>
+            <a:defRPr sz="900" b="0" i="0" u="none" strike="noStrike" kern="1200" baseline="0">
+              <a:solidFill>
+                <a:schemeClr val="tx1">
+                  <a:lumMod val="65000"/>
+                  <a:lumOff val="35000"/>
+                </a:schemeClr>
+              </a:solidFill>
+              <a:latin typeface="+mn-lt"/>
+              <a:ea typeface="+mn-ea"/>
+              <a:cs typeface="+mn-cs"/>
+            </a:defRPr>
+          </a:pPr>
+          <a:endParaRPr lang="en-US"/>
+        </a:p>
+      </c:txPr>
+    </c:legend>
+    <c:plotVisOnly val="1"/>
+    <c:dispBlanksAs val="gap"/>
+    <c:showDLblsOverMax val="0"/>
+  </c:chart>
+  <c:spPr>
+    <a:noFill/>
+    <a:ln>
+      <a:noFill/>
+    </a:ln>
+    <a:effectLst/>
+  </c:spPr>
+  <c:txPr>
+    <a:bodyPr/>
+    <a:lstStyle/>
+    <a:p>
+      <a:pPr>
+        <a:defRPr/>
+      </a:pPr>
+      <a:endParaRPr lang="en-US"/>
+    </a:p>
+  </c:txPr>
+  <c:externalData r:id="rId3">
+    <c:autoUpdate val="0"/>
+  </c:externalData>
+</c:chartSpace>
+</file>
+
+<file path=ppt/charts/colors1.xml><?xml version="1.0" encoding="utf-8"?>
+<cs:colorStyle xmlns:cs="http://schemas.microsoft.com/office/drawing/2012/chartStyle" xmlns:a="http://schemas.openxmlformats.org/drawingml/2006/main" meth="cycle" id="10">
+  <a:schemeClr val="accent1"/>
+  <a:schemeClr val="accent2"/>
+  <a:schemeClr val="accent3"/>
+  <a:schemeClr val="accent4"/>
+  <a:schemeClr val="accent5"/>
+  <a:schemeClr val="accent6"/>
+  <cs:variation/>
+  <cs:variation>
+    <a:lumMod val="60000"/>
+  </cs:variation>
+  <cs:variation>
+    <a:lumMod val="80000"/>
+    <a:lumOff val="20000"/>
+  </cs:variation>
+  <cs:variation>
+    <a:lumMod val="80000"/>
+  </cs:variation>
+  <cs:variation>
+    <a:lumMod val="60000"/>
+    <a:lumOff val="40000"/>
+  </cs:variation>
+  <cs:variation>
+    <a:lumMod val="50000"/>
+  </cs:variation>
+  <cs:variation>
+    <a:lumMod val="70000"/>
+    <a:lumOff val="30000"/>
+  </cs:variation>
+  <cs:variation>
+    <a:lumMod val="70000"/>
+  </cs:variation>
+  <cs:variation>
+    <a:lumMod val="50000"/>
+    <a:lumOff val="50000"/>
+  </cs:variation>
+</cs:colorStyle>
+</file>
+
+<file path=ppt/charts/style1.xml><?xml version="1.0" encoding="utf-8"?>
+<cs:chartStyle xmlns:cs="http://schemas.microsoft.com/office/drawing/2012/chartStyle" xmlns:a="http://schemas.openxmlformats.org/drawingml/2006/main" id="227">
+  <cs:axisTitle>
+    <cs:lnRef idx="0"/>
+    <cs:fillRef idx="0"/>
+    <cs:effectRef idx="0"/>
+    <cs:fontRef idx="minor">
+      <a:schemeClr val="tx1">
+        <a:lumMod val="65000"/>
+        <a:lumOff val="35000"/>
+      </a:schemeClr>
+    </cs:fontRef>
+    <cs:defRPr sz="1000" kern="1200"/>
+  </cs:axisTitle>
+  <cs:categoryAxis>
+    <cs:lnRef idx="0"/>
+    <cs:fillRef idx="0"/>
+    <cs:effectRef idx="0"/>
+    <cs:fontRef idx="minor">
+      <a:schemeClr val="tx1">
+        <a:lumMod val="65000"/>
+        <a:lumOff val="35000"/>
+      </a:schemeClr>
+    </cs:fontRef>
+    <cs:spPr>
+      <a:ln w="9525" cap="flat" cmpd="sng" algn="ctr">
+        <a:solidFill>
+          <a:schemeClr val="tx1">
+            <a:lumMod val="15000"/>
+            <a:lumOff val="85000"/>
+          </a:schemeClr>
+        </a:solidFill>
+        <a:round/>
+      </a:ln>
+    </cs:spPr>
+    <cs:defRPr sz="900" kern="1200"/>
+  </cs:categoryAxis>
+  <cs:chartArea mods="allowNoFillOverride allowNoLineOverride">
+    <cs:lnRef idx="0"/>
+    <cs:fillRef idx="0"/>
+    <cs:effectRef idx="0"/>
+    <cs:fontRef idx="minor">
+      <a:schemeClr val="tx1"/>
+    </cs:fontRef>
+    <cs:spPr>
+      <a:solidFill>
+        <a:schemeClr val="bg1"/>
+      </a:solidFill>
+      <a:ln w="9525" cap="flat" cmpd="sng" algn="ctr">
+        <a:solidFill>
+          <a:schemeClr val="tx1">
+            <a:lumMod val="15000"/>
+            <a:lumOff val="85000"/>
+          </a:schemeClr>
+        </a:solidFill>
+        <a:round/>
+      </a:ln>
+    </cs:spPr>
+    <cs:defRPr sz="1000" kern="1200"/>
+  </cs:chartArea>
+  <cs:dataLabel>
+    <cs:lnRef idx="0"/>
+    <cs:fillRef idx="0"/>
+    <cs:effectRef idx="0"/>
+    <cs:fontRef idx="minor">
+      <a:schemeClr val="tx1">
+        <a:lumMod val="75000"/>
+        <a:lumOff val="25000"/>
+      </a:schemeClr>
+    </cs:fontRef>
+    <cs:defRPr sz="900" kern="1200"/>
+  </cs:dataLabel>
+  <cs:dataLabelCallout>
+    <cs:lnRef idx="0"/>
+    <cs:fillRef idx="0"/>
+    <cs:effectRef idx="0"/>
+    <cs:fontRef idx="minor">
+      <a:schemeClr val="dk1">
+        <a:lumMod val="65000"/>
+        <a:lumOff val="35000"/>
+      </a:schemeClr>
+    </cs:fontRef>
+    <cs:spPr>
+      <a:solidFill>
+        <a:schemeClr val="lt1"/>
+      </a:solidFill>
+      <a:ln>
+        <a:solidFill>
+          <a:schemeClr val="dk1">
+            <a:lumMod val="25000"/>
+            <a:lumOff val="75000"/>
+          </a:schemeClr>
+        </a:solidFill>
+      </a:ln>
+    </cs:spPr>
+    <cs:defRPr sz="900" kern="1200"/>
+    <cs:bodyPr rot="0" spcFirstLastPara="1" vertOverflow="clip" horzOverflow="clip" vert="horz" wrap="square" lIns="36576" tIns="18288" rIns="36576" bIns="18288" anchor="ctr" anchorCtr="1">
+      <a:spAutoFit/>
+    </cs:bodyPr>
+  </cs:dataLabelCallout>
+  <cs:dataPoint>
+    <cs:lnRef idx="0"/>
+    <cs:fillRef idx="1">
+      <cs:styleClr val="auto"/>
+    </cs:fillRef>
+    <cs:effectRef idx="0"/>
+    <cs:fontRef idx="minor">
+      <a:schemeClr val="tx1"/>
+    </cs:fontRef>
+    <cs:spPr>
+      <a:solidFill>
+        <a:schemeClr val="phClr"/>
+      </a:solidFill>
+    </cs:spPr>
+  </cs:dataPoint>
+  <cs:dataPoint3D>
+    <cs:lnRef idx="0"/>
+    <cs:fillRef idx="1">
+      <cs:styleClr val="auto"/>
+    </cs:fillRef>
+    <cs:effectRef idx="0"/>
+    <cs:fontRef idx="minor">
+      <a:schemeClr val="tx1"/>
+    </cs:fontRef>
+    <cs:spPr>
+      <a:solidFill>
+        <a:schemeClr val="phClr"/>
+      </a:solidFill>
+    </cs:spPr>
+  </cs:dataPoint3D>
+  <cs:dataPointLine>
+    <cs:lnRef idx="0">
+      <cs:styleClr val="auto"/>
+    </cs:lnRef>
+    <cs:fillRef idx="1"/>
+    <cs:effectRef idx="0"/>
+    <cs:fontRef idx="minor">
+      <a:schemeClr val="tx1"/>
+    </cs:fontRef>
+    <cs:spPr>
+      <a:ln w="28575" cap="rnd">
+        <a:solidFill>
+          <a:schemeClr val="phClr"/>
+        </a:solidFill>
+        <a:round/>
+      </a:ln>
+    </cs:spPr>
+  </cs:dataPointLine>
+  <cs:dataPointMarker>
+    <cs:lnRef idx="0">
+      <cs:styleClr val="auto"/>
+    </cs:lnRef>
+    <cs:fillRef idx="1">
+      <cs:styleClr val="auto"/>
+    </cs:fillRef>
+    <cs:effectRef idx="0"/>
+    <cs:fontRef idx="minor">
+      <a:schemeClr val="tx1"/>
+    </cs:fontRef>
+    <cs:spPr>
+      <a:solidFill>
+        <a:schemeClr val="phClr"/>
+      </a:solidFill>
+      <a:ln w="9525">
+        <a:solidFill>
+          <a:schemeClr val="phClr"/>
+        </a:solidFill>
+      </a:ln>
+    </cs:spPr>
+  </cs:dataPointMarker>
+  <cs:dataPointMarkerLayout symbol="circle" size="5"/>
+  <cs:dataPointWireframe>
+    <cs:lnRef idx="0">
+      <cs:styleClr val="auto"/>
+    </cs:lnRef>
+    <cs:fillRef idx="1"/>
+    <cs:effectRef idx="0"/>
+    <cs:fontRef idx="minor">
+      <a:schemeClr val="tx1"/>
+    </cs:fontRef>
+    <cs:spPr>
+      <a:ln w="9525" cap="rnd">
+        <a:solidFill>
+          <a:schemeClr val="phClr"/>
+        </a:solidFill>
+        <a:round/>
+      </a:ln>
+    </cs:spPr>
+  </cs:dataPointWireframe>
+  <cs:dataTable>
+    <cs:lnRef idx="0"/>
+    <cs:fillRef idx="0"/>
+    <cs:effectRef idx="0"/>
+    <cs:fontRef idx="minor">
+      <a:schemeClr val="tx1">
+        <a:lumMod val="65000"/>
+        <a:lumOff val="35000"/>
+      </a:schemeClr>
+    </cs:fontRef>
+    <cs:spPr>
+      <a:noFill/>
+      <a:ln w="9525" cap="flat" cmpd="sng" algn="ctr">
+        <a:solidFill>
+          <a:schemeClr val="tx1">
+            <a:lumMod val="15000"/>
+            <a:lumOff val="85000"/>
+          </a:schemeClr>
+        </a:solidFill>
+        <a:round/>
+      </a:ln>
+    </cs:spPr>
+    <cs:defRPr sz="900" kern="1200"/>
+  </cs:dataTable>
+  <cs:downBar>
+    <cs:lnRef idx="0"/>
+    <cs:fillRef idx="0"/>
+    <cs:effectRef idx="0"/>
+    <cs:fontRef idx="minor">
+      <a:schemeClr val="dk1"/>
+    </cs:fontRef>
+    <cs:spPr>
+      <a:solidFill>
+        <a:schemeClr val="dk1">
+          <a:lumMod val="65000"/>
+          <a:lumOff val="35000"/>
+        </a:schemeClr>
+      </a:solidFill>
+      <a:ln w="9525">
+        <a:solidFill>
+          <a:schemeClr val="tx1">
+            <a:lumMod val="65000"/>
+            <a:lumOff val="35000"/>
+          </a:schemeClr>
+        </a:solidFill>
+      </a:ln>
+    </cs:spPr>
+  </cs:downBar>
+  <cs:dropLine>
+    <cs:lnRef idx="0"/>
+    <cs:fillRef idx="0"/>
+    <cs:effectRef idx="0"/>
+    <cs:fontRef idx="minor">
+      <a:schemeClr val="tx1"/>
+    </cs:fontRef>
+    <cs:spPr>
+      <a:ln w="9525" cap="flat" cmpd="sng" algn="ctr">
+        <a:solidFill>
+          <a:schemeClr val="tx1">
+            <a:lumMod val="35000"/>
+            <a:lumOff val="65000"/>
+          </a:schemeClr>
+        </a:solidFill>
+        <a:round/>
+      </a:ln>
+    </cs:spPr>
+  </cs:dropLine>
+  <cs:errorBar>
+    <cs:lnRef idx="0"/>
+    <cs:fillRef idx="0"/>
+    <cs:effectRef idx="0"/>
+    <cs:fontRef idx="minor">
+      <a:schemeClr val="tx1"/>
+    </cs:fontRef>
+    <cs:spPr>
+      <a:ln w="9525" cap="flat" cmpd="sng" algn="ctr">
+        <a:solidFill>
+          <a:schemeClr val="tx1">
+            <a:lumMod val="65000"/>
+            <a:lumOff val="35000"/>
+          </a:schemeClr>
+        </a:solidFill>
+        <a:round/>
+      </a:ln>
+    </cs:spPr>
+  </cs:errorBar>
+  <cs:floor>
+    <cs:lnRef idx="0"/>
+    <cs:fillRef idx="0"/>
+    <cs:effectRef idx="0"/>
+    <cs:fontRef idx="minor">
+      <a:schemeClr val="tx1"/>
+    </cs:fontRef>
+    <cs:spPr>
+      <a:noFill/>
+      <a:ln>
+        <a:noFill/>
+      </a:ln>
+    </cs:spPr>
+  </cs:floor>
+  <cs:gridlineMajor>
+    <cs:lnRef idx="0"/>
+    <cs:fillRef idx="0"/>
+    <cs:effectRef idx="0"/>
+    <cs:fontRef idx="minor">
+      <a:schemeClr val="tx1"/>
+    </cs:fontRef>
+    <cs:spPr>
+      <a:ln w="9525" cap="flat" cmpd="sng" algn="ctr">
+        <a:solidFill>
+          <a:schemeClr val="tx1">
+            <a:lumMod val="15000"/>
+            <a:lumOff val="85000"/>
+          </a:schemeClr>
+        </a:solidFill>
+        <a:round/>
+      </a:ln>
+    </cs:spPr>
+  </cs:gridlineMajor>
+  <cs:gridlineMinor>
+    <cs:lnRef idx="0"/>
+    <cs:fillRef idx="0"/>
+    <cs:effectRef idx="0"/>
+    <cs:fontRef idx="minor">
+      <a:schemeClr val="tx1"/>
+    </cs:fontRef>
+    <cs:spPr>
+      <a:ln w="9525" cap="flat" cmpd="sng" algn="ctr">
+        <a:solidFill>
+          <a:schemeClr val="tx1">
+            <a:lumMod val="5000"/>
+            <a:lumOff val="95000"/>
+          </a:schemeClr>
+        </a:solidFill>
+        <a:round/>
+      </a:ln>
+    </cs:spPr>
+  </cs:gridlineMinor>
+  <cs:hiLoLine>
+    <cs:lnRef idx="0"/>
+    <cs:fillRef idx="0"/>
+    <cs:effectRef idx="0"/>
+    <cs:fontRef idx="minor">
+      <a:schemeClr val="tx1"/>
+    </cs:fontRef>
+    <cs:spPr>
+      <a:ln w="9525" cap="flat" cmpd="sng" algn="ctr">
+        <a:solidFill>
+          <a:schemeClr val="tx1">
+            <a:lumMod val="75000"/>
+            <a:lumOff val="25000"/>
+          </a:schemeClr>
+        </a:solidFill>
+        <a:round/>
+      </a:ln>
+    </cs:spPr>
+  </cs:hiLoLine>
+  <cs:leaderLine>
+    <cs:lnRef idx="0"/>
+    <cs:fillRef idx="0"/>
+    <cs:effectRef idx="0"/>
+    <cs:fontRef idx="minor">
+      <a:schemeClr val="tx1"/>
+    </cs:fontRef>
+    <cs:spPr>
+      <a:ln w="9525" cap="flat" cmpd="sng" algn="ctr">
+        <a:solidFill>
+          <a:schemeClr val="tx1">
+            <a:lumMod val="35000"/>
+            <a:lumOff val="65000"/>
+          </a:schemeClr>
+        </a:solidFill>
+        <a:round/>
+      </a:ln>
+    </cs:spPr>
+  </cs:leaderLine>
+  <cs:legend>
+    <cs:lnRef idx="0"/>
+    <cs:fillRef idx="0"/>
+    <cs:effectRef idx="0"/>
+    <cs:fontRef idx="minor">
+      <a:schemeClr val="tx1">
+        <a:lumMod val="65000"/>
+        <a:lumOff val="35000"/>
+      </a:schemeClr>
+    </cs:fontRef>
+    <cs:defRPr sz="900" kern="1200"/>
+  </cs:legend>
+  <cs:plotArea mods="allowNoFillOverride allowNoLineOverride">
+    <cs:lnRef idx="0"/>
+    <cs:fillRef idx="0"/>
+    <cs:effectRef idx="0"/>
+    <cs:fontRef idx="minor">
+      <a:schemeClr val="tx1"/>
+    </cs:fontRef>
+  </cs:plotArea>
+  <cs:plotArea3D mods="allowNoFillOverride allowNoLineOverride">
+    <cs:lnRef idx="0"/>
+    <cs:fillRef idx="0"/>
+    <cs:effectRef idx="0"/>
+    <cs:fontRef idx="minor">
+      <a:schemeClr val="tx1"/>
+    </cs:fontRef>
+  </cs:plotArea3D>
+  <cs:seriesAxis>
+    <cs:lnRef idx="0"/>
+    <cs:fillRef idx="0"/>
+    <cs:effectRef idx="0"/>
+    <cs:fontRef idx="minor">
+      <a:schemeClr val="tx1">
+        <a:lumMod val="65000"/>
+        <a:lumOff val="35000"/>
+      </a:schemeClr>
+    </cs:fontRef>
+    <cs:defRPr sz="900" kern="1200"/>
+  </cs:seriesAxis>
+  <cs:seriesLine>
+    <cs:lnRef idx="0"/>
+    <cs:fillRef idx="0"/>
+    <cs:effectRef idx="0"/>
+    <cs:fontRef idx="minor">
+      <a:schemeClr val="tx1"/>
+    </cs:fontRef>
+    <cs:spPr>
+      <a:ln w="9525" cap="flat" cmpd="sng" algn="ctr">
+        <a:solidFill>
+          <a:schemeClr val="tx1">
+            <a:lumMod val="35000"/>
+            <a:lumOff val="65000"/>
+          </a:schemeClr>
+        </a:solidFill>
+        <a:round/>
+      </a:ln>
+    </cs:spPr>
+  </cs:seriesLine>
+  <cs:title>
+    <cs:lnRef idx="0"/>
+    <cs:fillRef idx="0"/>
+    <cs:effectRef idx="0"/>
+    <cs:fontRef idx="minor">
+      <a:schemeClr val="tx1">
+        <a:lumMod val="65000"/>
+        <a:lumOff val="35000"/>
+      </a:schemeClr>
+    </cs:fontRef>
+    <cs:defRPr sz="1400" b="0" kern="1200" spc="0" baseline="0"/>
+  </cs:title>
+  <cs:trendline>
+    <cs:lnRef idx="0">
+      <cs:styleClr val="auto"/>
+    </cs:lnRef>
+    <cs:fillRef idx="0"/>
+    <cs:effectRef idx="0"/>
+    <cs:fontRef idx="minor">
+      <a:schemeClr val="tx1"/>
+    </cs:fontRef>
+    <cs:spPr>
+      <a:ln w="19050" cap="rnd">
+        <a:solidFill>
+          <a:schemeClr val="phClr"/>
+        </a:solidFill>
+        <a:prstDash val="sysDot"/>
+      </a:ln>
+    </cs:spPr>
+  </cs:trendline>
+  <cs:trendlineLabel>
+    <cs:lnRef idx="0"/>
+    <cs:fillRef idx="0"/>
+    <cs:effectRef idx="0"/>
+    <cs:fontRef idx="minor">
+      <a:schemeClr val="tx1">
+        <a:lumMod val="65000"/>
+        <a:lumOff val="35000"/>
+      </a:schemeClr>
+    </cs:fontRef>
+    <cs:defRPr sz="900" kern="1200"/>
+  </cs:trendlineLabel>
+  <cs:upBar>
+    <cs:lnRef idx="0"/>
+    <cs:fillRef idx="0"/>
+    <cs:effectRef idx="0"/>
+    <cs:fontRef idx="minor">
+      <a:schemeClr val="dk1"/>
+    </cs:fontRef>
+    <cs:spPr>
+      <a:solidFill>
+        <a:schemeClr val="lt1"/>
+      </a:solidFill>
+      <a:ln w="9525">
+        <a:solidFill>
+          <a:schemeClr val="tx1">
+            <a:lumMod val="15000"/>
+            <a:lumOff val="85000"/>
+          </a:schemeClr>
+        </a:solidFill>
+      </a:ln>
+    </cs:spPr>
+  </cs:upBar>
+  <cs:valueAxis>
+    <cs:lnRef idx="0"/>
+    <cs:fillRef idx="0"/>
+    <cs:effectRef idx="0"/>
+    <cs:fontRef idx="minor">
+      <a:schemeClr val="tx1">
+        <a:lumMod val="65000"/>
+        <a:lumOff val="35000"/>
+      </a:schemeClr>
+    </cs:fontRef>
+    <cs:defRPr sz="900" kern="1200"/>
+  </cs:valueAxis>
+  <cs:wall>
+    <cs:lnRef idx="0"/>
+    <cs:fillRef idx="0"/>
+    <cs:effectRef idx="0"/>
+    <cs:fontRef idx="minor">
+      <a:schemeClr val="tx1"/>
+    </cs:fontRef>
+    <cs:spPr>
+      <a:noFill/>
+      <a:ln>
+        <a:noFill/>
+      </a:ln>
+    </cs:spPr>
+  </cs:wall>
+</cs:chartStyle>
 </file>
 
 <file path=ppt/slideLayouts/slideLayout1.xml><?xml version="1.0" encoding="utf-8"?>
@@ -446,7 +1596,7 @@
           </a:lstStyle>
           <a:p>
             <a:r>
-              <a:rPr lang="en-US" smtClean="0"/>
+              <a:rPr lang="en-US"/>
               <a:t>Click to edit Master title style</a:t>
             </a:r>
             <a:endParaRPr lang="en-US" dirty="0"/>
@@ -593,7 +1743,7 @@
               <a:defRPr/>
             </a:pPr>
             <a:r>
-              <a:rPr lang="en-US" smtClean="0"/>
+              <a:rPr lang="en-US"/>
               <a:t>Click to edit Master subtitle style</a:t>
             </a:r>
             <a:endParaRPr lang="en-US" dirty="0"/>
@@ -617,7 +1767,7 @@
           <a:p>
             <a:fld id="{47D97CC4-6134-417E-829A-2BB80557AF21}" type="datetimeFigureOut">
               <a:rPr lang="en-ZA" smtClean="0"/>
-              <a:t>2016-07-28</a:t>
+              <a:t>2016-07-29</a:t>
             </a:fld>
             <a:endParaRPr lang="en-ZA"/>
           </a:p>
@@ -706,10 +1856,9 @@
           <a:lstStyle/>
           <a:p>
             <a:r>
-              <a:rPr lang="en-US" smtClean="0"/>
+              <a:rPr lang="en-US"/>
               <a:t>Click to edit Master title style</a:t>
             </a:r>
-            <a:endParaRPr lang="en-US"/>
           </a:p>
         </p:txBody>
       </p:sp>
@@ -730,38 +1879,37 @@
           <a:p>
             <a:pPr lvl="0"/>
             <a:r>
-              <a:rPr lang="en-US" smtClean="0"/>
+              <a:rPr lang="en-US"/>
               <a:t>Click to edit Master text styles</a:t>
             </a:r>
           </a:p>
           <a:p>
             <a:pPr lvl="1"/>
             <a:r>
-              <a:rPr lang="en-US" smtClean="0"/>
+              <a:rPr lang="en-US"/>
               <a:t>Second level</a:t>
             </a:r>
           </a:p>
           <a:p>
             <a:pPr lvl="2"/>
             <a:r>
-              <a:rPr lang="en-US" smtClean="0"/>
+              <a:rPr lang="en-US"/>
               <a:t>Third level</a:t>
             </a:r>
           </a:p>
           <a:p>
             <a:pPr lvl="3"/>
             <a:r>
-              <a:rPr lang="en-US" smtClean="0"/>
+              <a:rPr lang="en-US"/>
               <a:t>Fourth level</a:t>
             </a:r>
           </a:p>
           <a:p>
             <a:pPr lvl="4"/>
             <a:r>
-              <a:rPr lang="en-US" smtClean="0"/>
+              <a:rPr lang="en-US"/>
               <a:t>Fifth level</a:t>
             </a:r>
-            <a:endParaRPr lang="en-US"/>
           </a:p>
         </p:txBody>
       </p:sp>
@@ -782,7 +1930,7 @@
           <a:p>
             <a:fld id="{47D97CC4-6134-417E-829A-2BB80557AF21}" type="datetimeFigureOut">
               <a:rPr lang="en-ZA" smtClean="0"/>
-              <a:t>2016-07-28</a:t>
+              <a:t>2016-07-29</a:t>
             </a:fld>
             <a:endParaRPr lang="en-ZA"/>
           </a:p>
@@ -876,7 +2024,7 @@
           <a:lstStyle/>
           <a:p>
             <a:r>
-              <a:rPr lang="en-US" smtClean="0"/>
+              <a:rPr lang="en-US"/>
               <a:t>Click to edit Master title style</a:t>
             </a:r>
             <a:endParaRPr lang="en-US" dirty="0"/>
@@ -905,38 +2053,37 @@
           <a:p>
             <a:pPr lvl="0"/>
             <a:r>
-              <a:rPr lang="en-US" smtClean="0"/>
+              <a:rPr lang="en-US"/>
               <a:t>Click to edit Master text styles</a:t>
             </a:r>
           </a:p>
           <a:p>
             <a:pPr lvl="1"/>
             <a:r>
-              <a:rPr lang="en-US" smtClean="0"/>
+              <a:rPr lang="en-US"/>
               <a:t>Second level</a:t>
             </a:r>
           </a:p>
           <a:p>
             <a:pPr lvl="2"/>
             <a:r>
-              <a:rPr lang="en-US" smtClean="0"/>
+              <a:rPr lang="en-US"/>
               <a:t>Third level</a:t>
             </a:r>
           </a:p>
           <a:p>
             <a:pPr lvl="3"/>
             <a:r>
-              <a:rPr lang="en-US" smtClean="0"/>
+              <a:rPr lang="en-US"/>
               <a:t>Fourth level</a:t>
             </a:r>
           </a:p>
           <a:p>
             <a:pPr lvl="4"/>
             <a:r>
-              <a:rPr lang="en-US" smtClean="0"/>
+              <a:rPr lang="en-US"/>
               <a:t>Fifth level</a:t>
             </a:r>
-            <a:endParaRPr lang="en-US"/>
           </a:p>
         </p:txBody>
       </p:sp>
@@ -957,7 +2104,7 @@
           <a:p>
             <a:fld id="{47D97CC4-6134-417E-829A-2BB80557AF21}" type="datetimeFigureOut">
               <a:rPr lang="en-ZA" smtClean="0"/>
-              <a:t>2016-07-28</a:t>
+              <a:t>2016-07-29</a:t>
             </a:fld>
             <a:endParaRPr lang="en-ZA"/>
           </a:p>
@@ -1046,10 +2193,9 @@
           <a:lstStyle/>
           <a:p>
             <a:r>
-              <a:rPr lang="en-US" smtClean="0"/>
+              <a:rPr lang="en-US"/>
               <a:t>Click to edit Master title style</a:t>
             </a:r>
-            <a:endParaRPr lang="en-US"/>
           </a:p>
         </p:txBody>
       </p:sp>
@@ -1070,35 +2216,35 @@
           <a:p>
             <a:pPr lvl="0"/>
             <a:r>
-              <a:rPr lang="en-US" smtClean="0"/>
+              <a:rPr lang="en-US"/>
               <a:t>Click to edit Master text styles</a:t>
             </a:r>
           </a:p>
           <a:p>
             <a:pPr lvl="1"/>
             <a:r>
-              <a:rPr lang="en-US" smtClean="0"/>
+              <a:rPr lang="en-US"/>
               <a:t>Second level</a:t>
             </a:r>
           </a:p>
           <a:p>
             <a:pPr lvl="2"/>
             <a:r>
-              <a:rPr lang="en-US" smtClean="0"/>
+              <a:rPr lang="en-US"/>
               <a:t>Third level</a:t>
             </a:r>
           </a:p>
           <a:p>
             <a:pPr lvl="3"/>
             <a:r>
-              <a:rPr lang="en-US" smtClean="0"/>
+              <a:rPr lang="en-US"/>
               <a:t>Fourth level</a:t>
             </a:r>
           </a:p>
           <a:p>
             <a:pPr lvl="4"/>
             <a:r>
-              <a:rPr lang="en-US" smtClean="0"/>
+              <a:rPr lang="en-US"/>
               <a:t>Fifth level</a:t>
             </a:r>
             <a:endParaRPr lang="en-US" dirty="0"/>
@@ -1122,7 +2268,7 @@
           <a:p>
             <a:fld id="{47D97CC4-6134-417E-829A-2BB80557AF21}" type="datetimeFigureOut">
               <a:rPr lang="en-ZA" smtClean="0"/>
-              <a:t>2016-07-28</a:t>
+              <a:t>2016-07-29</a:t>
             </a:fld>
             <a:endParaRPr lang="en-ZA"/>
           </a:p>
@@ -1505,7 +2651,7 @@
               <a:defRPr/>
             </a:pPr>
             <a:r>
-              <a:rPr lang="en-US" smtClean="0"/>
+              <a:rPr lang="en-US"/>
               <a:t>Click to edit Master title style</a:t>
             </a:r>
             <a:endParaRPr lang="en-US" dirty="0"/>
@@ -1652,7 +2798,7 @@
               <a:defRPr/>
             </a:pPr>
             <a:r>
-              <a:rPr lang="en-US" smtClean="0"/>
+              <a:rPr lang="en-US"/>
               <a:t>Click to edit Master text styles</a:t>
             </a:r>
           </a:p>
@@ -1675,7 +2821,7 @@
           <a:p>
             <a:fld id="{47D97CC4-6134-417E-829A-2BB80557AF21}" type="datetimeFigureOut">
               <a:rPr lang="en-ZA" smtClean="0"/>
-              <a:t>2016-07-28</a:t>
+              <a:t>2016-07-29</a:t>
             </a:fld>
             <a:endParaRPr lang="en-ZA"/>
           </a:p>
@@ -1798,35 +2944,35 @@
           <a:p>
             <a:pPr lvl="0"/>
             <a:r>
-              <a:rPr lang="en-US" smtClean="0"/>
+              <a:rPr lang="en-US"/>
               <a:t>Click to edit Master text styles</a:t>
             </a:r>
           </a:p>
           <a:p>
             <a:pPr lvl="1"/>
             <a:r>
-              <a:rPr lang="en-US" smtClean="0"/>
+              <a:rPr lang="en-US"/>
               <a:t>Second level</a:t>
             </a:r>
           </a:p>
           <a:p>
             <a:pPr lvl="2"/>
             <a:r>
-              <a:rPr lang="en-US" smtClean="0"/>
+              <a:rPr lang="en-US"/>
               <a:t>Third level</a:t>
             </a:r>
           </a:p>
           <a:p>
             <a:pPr lvl="3"/>
             <a:r>
-              <a:rPr lang="en-US" smtClean="0"/>
+              <a:rPr lang="en-US"/>
               <a:t>Fourth level</a:t>
             </a:r>
           </a:p>
           <a:p>
             <a:pPr lvl="4"/>
             <a:r>
-              <a:rPr lang="en-US" smtClean="0"/>
+              <a:rPr lang="en-US"/>
               <a:t>Fifth level</a:t>
             </a:r>
             <a:endParaRPr lang="en-US" dirty="0"/>
@@ -1883,35 +3029,35 @@
           <a:p>
             <a:pPr lvl="0"/>
             <a:r>
-              <a:rPr lang="en-US" smtClean="0"/>
+              <a:rPr lang="en-US"/>
               <a:t>Click to edit Master text styles</a:t>
             </a:r>
           </a:p>
           <a:p>
             <a:pPr lvl="1"/>
             <a:r>
-              <a:rPr lang="en-US" smtClean="0"/>
+              <a:rPr lang="en-US"/>
               <a:t>Second level</a:t>
             </a:r>
           </a:p>
           <a:p>
             <a:pPr lvl="2"/>
             <a:r>
-              <a:rPr lang="en-US" smtClean="0"/>
+              <a:rPr lang="en-US"/>
               <a:t>Third level</a:t>
             </a:r>
           </a:p>
           <a:p>
             <a:pPr lvl="3"/>
             <a:r>
-              <a:rPr lang="en-US" smtClean="0"/>
+              <a:rPr lang="en-US"/>
               <a:t>Fourth level</a:t>
             </a:r>
           </a:p>
           <a:p>
             <a:pPr lvl="4"/>
             <a:r>
-              <a:rPr lang="en-US" smtClean="0"/>
+              <a:rPr lang="en-US"/>
               <a:t>Fifth level</a:t>
             </a:r>
             <a:endParaRPr lang="en-US" dirty="0"/>
@@ -1935,7 +3081,7 @@
           <a:p>
             <a:fld id="{47D97CC4-6134-417E-829A-2BB80557AF21}" type="datetimeFigureOut">
               <a:rPr lang="en-ZA" smtClean="0"/>
-              <a:t>2016-07-28</a:t>
+              <a:t>2016-07-29</a:t>
             </a:fld>
             <a:endParaRPr lang="en-ZA"/>
           </a:p>
@@ -1999,10 +3145,9 @@
           <a:lstStyle/>
           <a:p>
             <a:r>
-              <a:rPr lang="en-US" smtClean="0"/>
+              <a:rPr lang="en-US"/>
               <a:t>Click to edit Master title style</a:t>
             </a:r>
-            <a:endParaRPr lang="en-US"/>
           </a:p>
         </p:txBody>
       </p:sp>
@@ -2051,10 +3196,9 @@
           </a:lstStyle>
           <a:p>
             <a:r>
-              <a:rPr lang="en-US" smtClean="0"/>
+              <a:rPr lang="en-US"/>
               <a:t>Click to edit Master title style</a:t>
             </a:r>
-            <a:endParaRPr lang="en-US"/>
           </a:p>
         </p:txBody>
       </p:sp>
@@ -2141,7 +3285,7 @@
               <a:buNone/>
             </a:pPr>
             <a:r>
-              <a:rPr lang="en-US" smtClean="0"/>
+              <a:rPr lang="en-US"/>
               <a:t>Click to edit Master text styles</a:t>
             </a:r>
           </a:p>
@@ -2197,35 +3341,35 @@
           <a:p>
             <a:pPr lvl="0"/>
             <a:r>
-              <a:rPr lang="en-US" smtClean="0"/>
+              <a:rPr lang="en-US"/>
               <a:t>Click to edit Master text styles</a:t>
             </a:r>
           </a:p>
           <a:p>
             <a:pPr lvl="1"/>
             <a:r>
-              <a:rPr lang="en-US" smtClean="0"/>
+              <a:rPr lang="en-US"/>
               <a:t>Second level</a:t>
             </a:r>
           </a:p>
           <a:p>
             <a:pPr lvl="2"/>
             <a:r>
-              <a:rPr lang="en-US" smtClean="0"/>
+              <a:rPr lang="en-US"/>
               <a:t>Third level</a:t>
             </a:r>
           </a:p>
           <a:p>
             <a:pPr lvl="3"/>
             <a:r>
-              <a:rPr lang="en-US" smtClean="0"/>
+              <a:rPr lang="en-US"/>
               <a:t>Fourth level</a:t>
             </a:r>
           </a:p>
           <a:p>
             <a:pPr lvl="4"/>
             <a:r>
-              <a:rPr lang="en-US" smtClean="0"/>
+              <a:rPr lang="en-US"/>
               <a:t>Fifth level</a:t>
             </a:r>
             <a:endParaRPr lang="en-US" dirty="0"/>
@@ -2315,7 +3459,7 @@
               <a:buNone/>
             </a:pPr>
             <a:r>
-              <a:rPr lang="en-US" smtClean="0"/>
+              <a:rPr lang="en-US"/>
               <a:t>Click to edit Master text styles</a:t>
             </a:r>
           </a:p>
@@ -2371,35 +3515,35 @@
           <a:p>
             <a:pPr lvl="0"/>
             <a:r>
-              <a:rPr lang="en-US" smtClean="0"/>
+              <a:rPr lang="en-US"/>
               <a:t>Click to edit Master text styles</a:t>
             </a:r>
           </a:p>
           <a:p>
             <a:pPr lvl="1"/>
             <a:r>
-              <a:rPr lang="en-US" smtClean="0"/>
+              <a:rPr lang="en-US"/>
               <a:t>Second level</a:t>
             </a:r>
           </a:p>
           <a:p>
             <a:pPr lvl="2"/>
             <a:r>
-              <a:rPr lang="en-US" smtClean="0"/>
+              <a:rPr lang="en-US"/>
               <a:t>Third level</a:t>
             </a:r>
           </a:p>
           <a:p>
             <a:pPr lvl="3"/>
             <a:r>
-              <a:rPr lang="en-US" smtClean="0"/>
+              <a:rPr lang="en-US"/>
               <a:t>Fourth level</a:t>
             </a:r>
           </a:p>
           <a:p>
             <a:pPr lvl="4"/>
             <a:r>
-              <a:rPr lang="en-US" smtClean="0"/>
+              <a:rPr lang="en-US"/>
               <a:t>Fifth level</a:t>
             </a:r>
             <a:endParaRPr lang="en-US" dirty="0"/>
@@ -2423,7 +3567,7 @@
           <a:p>
             <a:fld id="{47D97CC4-6134-417E-829A-2BB80557AF21}" type="datetimeFigureOut">
               <a:rPr lang="en-ZA" smtClean="0"/>
-              <a:t>2016-07-28</a:t>
+              <a:t>2016-07-29</a:t>
             </a:fld>
             <a:endParaRPr lang="en-ZA"/>
           </a:p>
@@ -2512,10 +3656,9 @@
           <a:lstStyle/>
           <a:p>
             <a:r>
-              <a:rPr lang="en-US" smtClean="0"/>
+              <a:rPr lang="en-US"/>
               <a:t>Click to edit Master title style</a:t>
             </a:r>
-            <a:endParaRPr lang="en-US"/>
           </a:p>
         </p:txBody>
       </p:sp>
@@ -2536,7 +3679,7 @@
           <a:p>
             <a:fld id="{47D97CC4-6134-417E-829A-2BB80557AF21}" type="datetimeFigureOut">
               <a:rPr lang="en-ZA" smtClean="0"/>
-              <a:t>2016-07-28</a:t>
+              <a:t>2016-07-29</a:t>
             </a:fld>
             <a:endParaRPr lang="en-ZA"/>
           </a:p>
@@ -2626,7 +3769,7 @@
           <a:p>
             <a:fld id="{47D97CC4-6134-417E-829A-2BB80557AF21}" type="datetimeFigureOut">
               <a:rPr lang="en-ZA" smtClean="0"/>
-              <a:t>2016-07-28</a:t>
+              <a:t>2016-07-29</a:t>
             </a:fld>
             <a:endParaRPr lang="en-ZA"/>
           </a:p>
@@ -2855,7 +3998,7 @@
               <a:defRPr/>
             </a:pPr>
             <a:r>
-              <a:rPr lang="en-US" smtClean="0"/>
+              <a:rPr lang="en-US"/>
               <a:t>Click to edit Master title style</a:t>
             </a:r>
             <a:endParaRPr lang="en-US" dirty="0"/>
@@ -2912,35 +4055,35 @@
           <a:p>
             <a:pPr lvl="0"/>
             <a:r>
-              <a:rPr lang="en-US" smtClean="0"/>
+              <a:rPr lang="en-US"/>
               <a:t>Click to edit Master text styles</a:t>
             </a:r>
           </a:p>
           <a:p>
             <a:pPr lvl="1"/>
             <a:r>
-              <a:rPr lang="en-US" smtClean="0"/>
+              <a:rPr lang="en-US"/>
               <a:t>Second level</a:t>
             </a:r>
           </a:p>
           <a:p>
             <a:pPr lvl="2"/>
             <a:r>
-              <a:rPr lang="en-US" smtClean="0"/>
+              <a:rPr lang="en-US"/>
               <a:t>Third level</a:t>
             </a:r>
           </a:p>
           <a:p>
             <a:pPr lvl="3"/>
             <a:r>
-              <a:rPr lang="en-US" smtClean="0"/>
+              <a:rPr lang="en-US"/>
               <a:t>Fourth level</a:t>
             </a:r>
           </a:p>
           <a:p>
             <a:pPr lvl="4"/>
             <a:r>
-              <a:rPr lang="en-US" smtClean="0"/>
+              <a:rPr lang="en-US"/>
               <a:t>Fifth level</a:t>
             </a:r>
             <a:endParaRPr lang="en-US" dirty="0"/>
@@ -3033,7 +4176,7 @@
               <a:defRPr/>
             </a:pPr>
             <a:r>
-              <a:rPr lang="en-US" smtClean="0"/>
+              <a:rPr lang="en-US"/>
               <a:t>Click to edit Master text styles</a:t>
             </a:r>
           </a:p>
@@ -3056,7 +4199,7 @@
           <a:p>
             <a:fld id="{47D97CC4-6134-417E-829A-2BB80557AF21}" type="datetimeFigureOut">
               <a:rPr lang="en-ZA" smtClean="0"/>
-              <a:t>2016-07-28</a:t>
+              <a:t>2016-07-29</a:t>
             </a:fld>
             <a:endParaRPr lang="en-ZA"/>
           </a:p>
@@ -3309,7 +4452,7 @@
           </a:lstStyle>
           <a:p>
             <a:r>
-              <a:rPr lang="en-US" smtClean="0"/>
+              <a:rPr lang="en-US"/>
               <a:t>Click icon to add picture</a:t>
             </a:r>
             <a:endParaRPr lang="en-US" dirty="0"/>
@@ -3496,7 +4639,7 @@
           </a:lstStyle>
           <a:p>
             <a:r>
-              <a:rPr lang="en-US" smtClean="0"/>
+              <a:rPr lang="en-US"/>
               <a:t>Click to edit Master title style</a:t>
             </a:r>
             <a:endParaRPr lang="en-US" dirty="0"/>
@@ -3566,7 +4709,7 @@
           <a:p>
             <a:pPr lvl="0"/>
             <a:r>
-              <a:rPr lang="en-US" smtClean="0"/>
+              <a:rPr lang="en-US"/>
               <a:t>Click to edit Master text styles</a:t>
             </a:r>
           </a:p>
@@ -3589,7 +4732,7 @@
           <a:p>
             <a:fld id="{47D97CC4-6134-417E-829A-2BB80557AF21}" type="datetimeFigureOut">
               <a:rPr lang="en-ZA" smtClean="0"/>
-              <a:t>2016-07-28</a:t>
+              <a:t>2016-07-29</a:t>
             </a:fld>
             <a:endParaRPr lang="en-ZA"/>
           </a:p>
@@ -4327,7 +5470,7 @@
           <a:lstStyle/>
           <a:p>
             <a:r>
-              <a:rPr lang="en-US" smtClean="0"/>
+              <a:rPr lang="en-US"/>
               <a:t>Click to edit Master title style</a:t>
             </a:r>
             <a:endParaRPr lang="en-US" dirty="0"/>
@@ -4361,35 +5504,35 @@
           <a:p>
             <a:pPr lvl="0"/>
             <a:r>
-              <a:rPr lang="en-US" smtClean="0"/>
+              <a:rPr lang="en-US"/>
               <a:t>Click to edit Master text styles</a:t>
             </a:r>
           </a:p>
           <a:p>
             <a:pPr lvl="1"/>
             <a:r>
-              <a:rPr lang="en-US" smtClean="0"/>
+              <a:rPr lang="en-US"/>
               <a:t>Second level</a:t>
             </a:r>
           </a:p>
           <a:p>
             <a:pPr lvl="2"/>
             <a:r>
-              <a:rPr lang="en-US" smtClean="0"/>
+              <a:rPr lang="en-US"/>
               <a:t>Third level</a:t>
             </a:r>
           </a:p>
           <a:p>
             <a:pPr lvl="3"/>
             <a:r>
-              <a:rPr lang="en-US" smtClean="0"/>
+              <a:rPr lang="en-US"/>
               <a:t>Fourth level</a:t>
             </a:r>
           </a:p>
           <a:p>
             <a:pPr lvl="4"/>
             <a:r>
-              <a:rPr lang="en-US" smtClean="0"/>
+              <a:rPr lang="en-US"/>
               <a:t>Fifth level</a:t>
             </a:r>
             <a:endParaRPr lang="en-US" dirty="0"/>
@@ -4429,7 +5572,7 @@
           <a:p>
             <a:fld id="{47D97CC4-6134-417E-829A-2BB80557AF21}" type="datetimeFigureOut">
               <a:rPr lang="en-ZA" smtClean="0"/>
-              <a:t>2016-07-28</a:t>
+              <a:t>2016-07-29</a:t>
             </a:fld>
             <a:endParaRPr lang="en-ZA"/>
           </a:p>
@@ -4847,10 +5990,9 @@
           <a:lstStyle/>
           <a:p>
             <a:r>
-              <a:rPr lang="en-ZA" dirty="0" smtClean="0"/>
+              <a:rPr lang="en-ZA" dirty="0"/>
               <a:t>Real-time geospatial Data processor and visualizer</a:t>
             </a:r>
-            <a:endParaRPr lang="en-ZA" dirty="0"/>
           </a:p>
         </p:txBody>
       </p:sp>
@@ -4870,18 +6012,17 @@
           <a:lstStyle/>
           <a:p>
             <a:r>
-              <a:rPr lang="en-ZA" dirty="0" smtClean="0"/>
+              <a:rPr lang="en-ZA" dirty="0"/>
               <a:t>Client: Werner </a:t>
             </a:r>
             <a:r>
-              <a:rPr lang="en-ZA" dirty="0" err="1" smtClean="0"/>
+              <a:rPr lang="en-ZA" dirty="0" err="1"/>
               <a:t>Raath</a:t>
             </a:r>
             <a:r>
-              <a:rPr lang="en-ZA" dirty="0" smtClean="0"/>
+              <a:rPr lang="en-ZA" dirty="0"/>
               <a:t> (CSIR)</a:t>
             </a:r>
-            <a:endParaRPr lang="en-ZA" dirty="0"/>
           </a:p>
         </p:txBody>
       </p:sp>
@@ -4953,13 +6094,6 @@
   <p:clrMapOvr>
     <a:masterClrMapping/>
   </p:clrMapOvr>
-  <p:timing>
-    <p:tnLst>
-      <p:par>
-        <p:cTn id="1" dur="indefinite" restart="never" nodeType="tmRoot"/>
-      </p:par>
-    </p:tnLst>
-  </p:timing>
 </p:sld>
 </file>
 
@@ -4996,10 +6130,9 @@
           <a:lstStyle/>
           <a:p>
             <a:r>
-              <a:rPr lang="en-ZA" dirty="0" smtClean="0"/>
+              <a:rPr lang="en-ZA" dirty="0"/>
               <a:t>overview</a:t>
             </a:r>
-            <a:endParaRPr lang="en-ZA" dirty="0"/>
           </a:p>
         </p:txBody>
       </p:sp>
@@ -5023,10 +6156,9 @@
               <a:buChar char="•"/>
             </a:pPr>
             <a:r>
-              <a:rPr lang="en-US" sz="2400" b="0" dirty="0" smtClean="0"/>
+              <a:rPr lang="en-US" sz="2400" b="0" dirty="0"/>
               <a:t>Scrum Meetings</a:t>
             </a:r>
-            <a:endParaRPr lang="en-US" sz="2400" b="0" dirty="0" smtClean="0"/>
           </a:p>
           <a:p>
             <a:pPr marL="285750" indent="-285750">
@@ -5034,10 +6166,9 @@
               <a:buChar char="•"/>
             </a:pPr>
             <a:r>
-              <a:rPr lang="en-US" sz="2400" b="0" dirty="0" smtClean="0"/>
+              <a:rPr lang="en-US" sz="2400" b="0" dirty="0"/>
               <a:t>Changes from previous demo</a:t>
             </a:r>
-            <a:endParaRPr lang="en-US" sz="2400" b="0" dirty="0" smtClean="0"/>
           </a:p>
           <a:p>
             <a:pPr marL="285750" indent="-285750">
@@ -5045,10 +6176,9 @@
               <a:buChar char="•"/>
             </a:pPr>
             <a:r>
-              <a:rPr lang="en-US" sz="2400" b="0" dirty="0" smtClean="0"/>
+              <a:rPr lang="en-US" sz="2400" b="0" dirty="0"/>
               <a:t>Client Meetings</a:t>
             </a:r>
-            <a:endParaRPr lang="en-US" sz="2400" b="0" dirty="0"/>
           </a:p>
           <a:p>
             <a:pPr marL="285750" indent="-285750">
@@ -5056,10 +6186,9 @@
               <a:buChar char="•"/>
             </a:pPr>
             <a:r>
-              <a:rPr lang="en-US" sz="2400" b="0" dirty="0" smtClean="0"/>
+              <a:rPr lang="en-US" sz="2400" b="0" dirty="0"/>
               <a:t>Milestones</a:t>
             </a:r>
-            <a:endParaRPr lang="en-US" sz="2400" b="0" dirty="0" smtClean="0"/>
           </a:p>
           <a:p>
             <a:pPr marL="285750" indent="-285750">
@@ -5067,10 +6196,9 @@
               <a:buChar char="•"/>
             </a:pPr>
             <a:r>
-              <a:rPr lang="en-US" sz="2400" b="0" dirty="0" smtClean="0"/>
+              <a:rPr lang="en-US" sz="2400" b="0" dirty="0"/>
               <a:t>Working features</a:t>
             </a:r>
-            <a:endParaRPr lang="en-US" sz="2400" b="0" dirty="0"/>
           </a:p>
           <a:p>
             <a:pPr>
@@ -5091,13 +6219,722 @@
   <p:clrMapOvr>
     <a:masterClrMapping/>
   </p:clrMapOvr>
-  <p:timing>
-    <p:tnLst>
-      <p:par>
-        <p:cTn id="1" dur="indefinite" restart="never" nodeType="tmRoot"/>
-      </p:par>
-    </p:tnLst>
-  </p:timing>
+</p:sld>
+</file>
+
+<file path=ppt/slides/slide3.xml><?xml version="1.0" encoding="utf-8"?>
+<p:sld xmlns:a="http://schemas.openxmlformats.org/drawingml/2006/main" xmlns:r="http://schemas.openxmlformats.org/officeDocument/2006/relationships" xmlns:p="http://schemas.openxmlformats.org/presentationml/2006/main">
+  <p:cSld>
+    <p:spTree>
+      <p:nvGrpSpPr>
+        <p:cNvPr id="1" name=""/>
+        <p:cNvGrpSpPr/>
+        <p:nvPr/>
+      </p:nvGrpSpPr>
+      <p:grpSpPr>
+        <a:xfrm>
+          <a:off x="0" y="0"/>
+          <a:ext cx="0" cy="0"/>
+          <a:chOff x="0" y="0"/>
+          <a:chExt cx="0" cy="0"/>
+        </a:xfrm>
+      </p:grpSpPr>
+      <p:sp>
+        <p:nvSpPr>
+          <p:cNvPr id="2" name="Title 1"/>
+          <p:cNvSpPr>
+            <a:spLocks noGrp="1"/>
+          </p:cNvSpPr>
+          <p:nvPr>
+            <p:ph type="title"/>
+          </p:nvPr>
+        </p:nvSpPr>
+        <p:spPr/>
+        <p:txBody>
+          <a:bodyPr/>
+          <a:lstStyle/>
+          <a:p>
+            <a:r>
+              <a:rPr lang="en-ZA" dirty="0"/>
+              <a:t>Changes from previous demo</a:t>
+            </a:r>
+          </a:p>
+        </p:txBody>
+      </p:sp>
+      <p:sp>
+        <p:nvSpPr>
+          <p:cNvPr id="3" name="Content Placeholder 2"/>
+          <p:cNvSpPr>
+            <a:spLocks noGrp="1"/>
+          </p:cNvSpPr>
+          <p:nvPr>
+            <p:ph idx="1"/>
+          </p:nvPr>
+        </p:nvSpPr>
+        <p:spPr/>
+        <p:txBody>
+          <a:bodyPr/>
+          <a:lstStyle/>
+          <a:p>
+            <a:pPr>
+              <a:buFont typeface="Arial" panose="020B0604020202020204" pitchFamily="34" charset="0"/>
+              <a:buChar char="•"/>
+            </a:pPr>
+            <a:endParaRPr lang="en-ZA" sz="1800" dirty="0" smtClean="0"/>
+          </a:p>
+          <a:p>
+            <a:pPr>
+              <a:buFont typeface="Arial" panose="020B0604020202020204" pitchFamily="34" charset="0"/>
+              <a:buChar char="•"/>
+            </a:pPr>
+            <a:r>
+              <a:rPr lang="en-ZA" sz="1800" dirty="0" smtClean="0"/>
+              <a:t>Technology Changes</a:t>
+            </a:r>
+            <a:endParaRPr lang="en-ZA" sz="1800" dirty="0"/>
+          </a:p>
+          <a:p>
+            <a:pPr marL="237744" lvl="2" indent="0">
+              <a:buNone/>
+            </a:pPr>
+            <a:endParaRPr lang="en-ZA" sz="1800" dirty="0"/>
+          </a:p>
+        </p:txBody>
+      </p:sp>
+    </p:spTree>
+    <p:extLst>
+      <p:ext uri="{BB962C8B-B14F-4D97-AF65-F5344CB8AC3E}">
+        <p14:creationId xmlns:p14="http://schemas.microsoft.com/office/powerpoint/2010/main" val="66360207"/>
+      </p:ext>
+    </p:extLst>
+  </p:cSld>
+  <p:clrMapOvr>
+    <a:masterClrMapping/>
+  </p:clrMapOvr>
+</p:sld>
+</file>
+
+<file path=ppt/slides/slide4.xml><?xml version="1.0" encoding="utf-8"?>
+<p:sld xmlns:a="http://schemas.openxmlformats.org/drawingml/2006/main" xmlns:r="http://schemas.openxmlformats.org/officeDocument/2006/relationships" xmlns:p="http://schemas.openxmlformats.org/presentationml/2006/main">
+  <p:cSld>
+    <p:spTree>
+      <p:nvGrpSpPr>
+        <p:cNvPr id="1" name=""/>
+        <p:cNvGrpSpPr/>
+        <p:nvPr/>
+      </p:nvGrpSpPr>
+      <p:grpSpPr>
+        <a:xfrm>
+          <a:off x="0" y="0"/>
+          <a:ext cx="0" cy="0"/>
+          <a:chOff x="0" y="0"/>
+          <a:chExt cx="0" cy="0"/>
+        </a:xfrm>
+      </p:grpSpPr>
+      <p:sp>
+        <p:nvSpPr>
+          <p:cNvPr id="2" name="Title 1"/>
+          <p:cNvSpPr>
+            <a:spLocks noGrp="1"/>
+          </p:cNvSpPr>
+          <p:nvPr>
+            <p:ph type="title"/>
+          </p:nvPr>
+        </p:nvSpPr>
+        <p:spPr/>
+        <p:txBody>
+          <a:bodyPr/>
+          <a:lstStyle/>
+          <a:p>
+            <a:r>
+              <a:rPr lang="en-ZA" dirty="0"/>
+              <a:t>Scrum meetings</a:t>
+            </a:r>
+          </a:p>
+        </p:txBody>
+      </p:sp>
+      <p:sp>
+        <p:nvSpPr>
+          <p:cNvPr id="3" name="Content Placeholder 2"/>
+          <p:cNvSpPr>
+            <a:spLocks noGrp="1"/>
+          </p:cNvSpPr>
+          <p:nvPr>
+            <p:ph idx="1"/>
+          </p:nvPr>
+        </p:nvSpPr>
+        <p:spPr>
+          <a:xfrm>
+            <a:off x="822960" y="914400"/>
+            <a:ext cx="7520940" cy="3766077"/>
+          </a:xfrm>
+        </p:spPr>
+        <p:txBody>
+          <a:bodyPr>
+            <a:normAutofit fontScale="92500" lnSpcReduction="10000"/>
+          </a:bodyPr>
+          <a:lstStyle/>
+          <a:p>
+            <a:pPr>
+              <a:buFont typeface="Arial" panose="020B0604020202020204" pitchFamily="34" charset="0"/>
+              <a:buChar char="•"/>
+            </a:pPr>
+            <a:r>
+              <a:rPr lang="en-ZA" sz="1800" dirty="0"/>
+              <a:t>Holidays</a:t>
+            </a:r>
+          </a:p>
+          <a:p>
+            <a:pPr lvl="2">
+              <a:buFont typeface="Arial" panose="020B0604020202020204" pitchFamily="34" charset="0"/>
+              <a:buChar char="•"/>
+            </a:pPr>
+            <a:r>
+              <a:rPr lang="en-ZA" sz="1800" dirty="0"/>
+              <a:t>3 times a week (Mon, Wed, Fri) from 11 – 3 pm</a:t>
+            </a:r>
+          </a:p>
+          <a:p>
+            <a:pPr lvl="2">
+              <a:buFont typeface="Arial" panose="020B0604020202020204" pitchFamily="34" charset="0"/>
+              <a:buChar char="•"/>
+            </a:pPr>
+            <a:r>
+              <a:rPr lang="en-ZA" sz="1800" dirty="0"/>
+              <a:t>Mainly doing research</a:t>
+            </a:r>
+          </a:p>
+          <a:p>
+            <a:pPr lvl="2">
+              <a:buFont typeface="Arial" panose="020B0604020202020204" pitchFamily="34" charset="0"/>
+              <a:buChar char="•"/>
+            </a:pPr>
+            <a:endParaRPr lang="en-ZA" sz="1800" dirty="0"/>
+          </a:p>
+          <a:p>
+            <a:pPr>
+              <a:buFont typeface="Arial" panose="020B0604020202020204" pitchFamily="34" charset="0"/>
+              <a:buChar char="•"/>
+            </a:pPr>
+            <a:r>
+              <a:rPr lang="en-ZA" sz="1800" dirty="0"/>
+              <a:t>During semester</a:t>
+            </a:r>
+          </a:p>
+          <a:p>
+            <a:pPr lvl="2">
+              <a:buFont typeface="Arial" panose="020B0604020202020204" pitchFamily="34" charset="0"/>
+              <a:buChar char="•"/>
+            </a:pPr>
+            <a:r>
+              <a:rPr lang="en-ZA" sz="1800" dirty="0"/>
+              <a:t>3 times a week (Mon, Tues, Thurs) for an hour or more</a:t>
+            </a:r>
+          </a:p>
+          <a:p>
+            <a:pPr lvl="2">
+              <a:buFont typeface="Arial" panose="020B0604020202020204" pitchFamily="34" charset="0"/>
+              <a:buChar char="•"/>
+            </a:pPr>
+            <a:endParaRPr lang="en-ZA" sz="1800" dirty="0"/>
+          </a:p>
+          <a:p>
+            <a:pPr>
+              <a:buFont typeface="Arial" panose="020B0604020202020204" pitchFamily="34" charset="0"/>
+              <a:buChar char="•"/>
+            </a:pPr>
+            <a:r>
+              <a:rPr lang="en-ZA" sz="1800" b="0" dirty="0"/>
+              <a:t>Other than the abovementioned times, meetings are held on Slack and </a:t>
+            </a:r>
+            <a:r>
+              <a:rPr lang="en-ZA" sz="1800" b="0" dirty="0" err="1"/>
+              <a:t>Whatsapp</a:t>
+            </a:r>
+            <a:r>
+              <a:rPr lang="en-ZA" sz="1800" b="0" dirty="0"/>
+              <a:t>.</a:t>
+            </a:r>
+          </a:p>
+          <a:p>
+            <a:pPr lvl="3">
+              <a:buFont typeface="Arial" panose="020B0604020202020204" pitchFamily="34" charset="0"/>
+              <a:buChar char="•"/>
+            </a:pPr>
+            <a:endParaRPr lang="en-ZA" sz="1800" dirty="0"/>
+          </a:p>
+          <a:p>
+            <a:pPr lvl="2">
+              <a:buFont typeface="Arial" panose="020B0604020202020204" pitchFamily="34" charset="0"/>
+              <a:buChar char="•"/>
+            </a:pPr>
+            <a:endParaRPr lang="en-ZA" sz="1800" dirty="0"/>
+          </a:p>
+          <a:p>
+            <a:r>
+              <a:rPr lang="en-ZA" sz="1800" dirty="0"/>
+              <a:t>	</a:t>
+            </a:r>
+          </a:p>
+          <a:p>
+            <a:endParaRPr lang="en-ZA" sz="1800" dirty="0"/>
+          </a:p>
+        </p:txBody>
+      </p:sp>
+    </p:spTree>
+    <p:extLst>
+      <p:ext uri="{BB962C8B-B14F-4D97-AF65-F5344CB8AC3E}">
+        <p14:creationId xmlns:p14="http://schemas.microsoft.com/office/powerpoint/2010/main" val="4081942627"/>
+      </p:ext>
+    </p:extLst>
+  </p:cSld>
+  <p:clrMapOvr>
+    <a:masterClrMapping/>
+  </p:clrMapOvr>
+</p:sld>
+</file>
+
+<file path=ppt/slides/slide5.xml><?xml version="1.0" encoding="utf-8"?>
+<p:sld xmlns:a="http://schemas.openxmlformats.org/drawingml/2006/main" xmlns:r="http://schemas.openxmlformats.org/officeDocument/2006/relationships" xmlns:p="http://schemas.openxmlformats.org/presentationml/2006/main">
+  <p:cSld>
+    <p:spTree>
+      <p:nvGrpSpPr>
+        <p:cNvPr id="1" name=""/>
+        <p:cNvGrpSpPr/>
+        <p:nvPr/>
+      </p:nvGrpSpPr>
+      <p:grpSpPr>
+        <a:xfrm>
+          <a:off x="0" y="0"/>
+          <a:ext cx="0" cy="0"/>
+          <a:chOff x="0" y="0"/>
+          <a:chExt cx="0" cy="0"/>
+        </a:xfrm>
+      </p:grpSpPr>
+      <p:sp>
+        <p:nvSpPr>
+          <p:cNvPr id="2" name="Title 1"/>
+          <p:cNvSpPr>
+            <a:spLocks noGrp="1"/>
+          </p:cNvSpPr>
+          <p:nvPr>
+            <p:ph type="title"/>
+          </p:nvPr>
+        </p:nvSpPr>
+        <p:spPr/>
+        <p:txBody>
+          <a:bodyPr/>
+          <a:lstStyle/>
+          <a:p>
+            <a:r>
+              <a:rPr lang="en-ZA" dirty="0" smtClean="0"/>
+              <a:t>burn-down chart </a:t>
+            </a:r>
+            <a:endParaRPr lang="en-ZA" dirty="0"/>
+          </a:p>
+        </p:txBody>
+      </p:sp>
+      <p:graphicFrame>
+        <p:nvGraphicFramePr>
+          <p:cNvPr id="4" name="Content Placeholder 3"/>
+          <p:cNvGraphicFramePr>
+            <a:graphicFrameLocks noGrp="1"/>
+          </p:cNvGraphicFramePr>
+          <p:nvPr>
+            <p:ph idx="1"/>
+            <p:extLst>
+              <p:ext uri="{D42A27DB-BD31-4B8C-83A1-F6EECF244321}">
+                <p14:modId xmlns:p14="http://schemas.microsoft.com/office/powerpoint/2010/main" val="3564938663"/>
+              </p:ext>
+            </p:extLst>
+          </p:nvPr>
+        </p:nvGraphicFramePr>
+        <p:xfrm>
+          <a:off x="822325" y="1124744"/>
+          <a:ext cx="7521575" cy="3555206"/>
+        </p:xfrm>
+        <a:graphic>
+          <a:graphicData uri="http://schemas.openxmlformats.org/drawingml/2006/chart">
+            <c:chart xmlns:c="http://schemas.openxmlformats.org/drawingml/2006/chart" xmlns:r="http://schemas.openxmlformats.org/officeDocument/2006/relationships" r:id="rId2"/>
+          </a:graphicData>
+        </a:graphic>
+      </p:graphicFrame>
+    </p:spTree>
+    <p:extLst>
+      <p:ext uri="{BB962C8B-B14F-4D97-AF65-F5344CB8AC3E}">
+        <p14:creationId xmlns:p14="http://schemas.microsoft.com/office/powerpoint/2010/main" val="1493006319"/>
+      </p:ext>
+    </p:extLst>
+  </p:cSld>
+  <p:clrMapOvr>
+    <a:masterClrMapping/>
+  </p:clrMapOvr>
+</p:sld>
+</file>
+
+<file path=ppt/slides/slide6.xml><?xml version="1.0" encoding="utf-8"?>
+<p:sld xmlns:a="http://schemas.openxmlformats.org/drawingml/2006/main" xmlns:r="http://schemas.openxmlformats.org/officeDocument/2006/relationships" xmlns:p="http://schemas.openxmlformats.org/presentationml/2006/main">
+  <p:cSld>
+    <p:spTree>
+      <p:nvGrpSpPr>
+        <p:cNvPr id="1" name=""/>
+        <p:cNvGrpSpPr/>
+        <p:nvPr/>
+      </p:nvGrpSpPr>
+      <p:grpSpPr>
+        <a:xfrm>
+          <a:off x="0" y="0"/>
+          <a:ext cx="0" cy="0"/>
+          <a:chOff x="0" y="0"/>
+          <a:chExt cx="0" cy="0"/>
+        </a:xfrm>
+      </p:grpSpPr>
+      <p:sp>
+        <p:nvSpPr>
+          <p:cNvPr id="2" name="Title 1"/>
+          <p:cNvSpPr>
+            <a:spLocks noGrp="1"/>
+          </p:cNvSpPr>
+          <p:nvPr>
+            <p:ph type="title"/>
+          </p:nvPr>
+        </p:nvSpPr>
+        <p:spPr/>
+        <p:txBody>
+          <a:bodyPr/>
+          <a:lstStyle/>
+          <a:p>
+            <a:r>
+              <a:rPr lang="en-ZA" dirty="0"/>
+              <a:t>Client meetings</a:t>
+            </a:r>
+          </a:p>
+        </p:txBody>
+      </p:sp>
+      <p:sp>
+        <p:nvSpPr>
+          <p:cNvPr id="3" name="Content Placeholder 2"/>
+          <p:cNvSpPr>
+            <a:spLocks noGrp="1"/>
+          </p:cNvSpPr>
+          <p:nvPr>
+            <p:ph idx="1"/>
+          </p:nvPr>
+        </p:nvSpPr>
+        <p:spPr>
+          <a:xfrm>
+            <a:off x="179512" y="1196752"/>
+            <a:ext cx="8568952" cy="4026768"/>
+          </a:xfrm>
+        </p:spPr>
+        <p:txBody>
+          <a:bodyPr>
+            <a:normAutofit/>
+          </a:bodyPr>
+          <a:lstStyle/>
+          <a:p>
+            <a:pPr lvl="1"/>
+            <a:r>
+              <a:rPr lang="en-ZA" sz="1800" dirty="0"/>
+              <a:t>Meeting on Tuesday, 26</a:t>
+            </a:r>
+            <a:r>
+              <a:rPr lang="en-ZA" sz="1800" baseline="30000" dirty="0"/>
+              <a:t>th</a:t>
+            </a:r>
+            <a:r>
+              <a:rPr lang="en-ZA" sz="1800" dirty="0"/>
+              <a:t> of July</a:t>
+            </a:r>
+          </a:p>
+          <a:p>
+            <a:pPr lvl="2"/>
+            <a:r>
+              <a:rPr lang="en-ZA" sz="1700" dirty="0"/>
+              <a:t>Showed what we have done so far</a:t>
+            </a:r>
+          </a:p>
+          <a:p>
+            <a:pPr lvl="2"/>
+            <a:r>
+              <a:rPr lang="en-ZA" sz="1700" dirty="0"/>
+              <a:t>Got some clarification</a:t>
+            </a:r>
+          </a:p>
+          <a:p>
+            <a:pPr lvl="2"/>
+            <a:r>
+              <a:rPr lang="en-ZA" sz="1700" dirty="0"/>
+              <a:t>Shared our complaints</a:t>
+            </a:r>
+            <a:endParaRPr lang="en-ZA" sz="1800" dirty="0"/>
+          </a:p>
+          <a:p>
+            <a:pPr lvl="2">
+              <a:buFont typeface="Arial" panose="020B0604020202020204" pitchFamily="34" charset="0"/>
+              <a:buChar char="•"/>
+            </a:pPr>
+            <a:r>
+              <a:rPr lang="en-ZA" sz="1800" dirty="0"/>
+              <a:t>Client:</a:t>
+            </a:r>
+          </a:p>
+          <a:p>
+            <a:pPr lvl="3">
+              <a:buFont typeface="Arial" panose="020B0604020202020204" pitchFamily="34" charset="0"/>
+              <a:buChar char="•"/>
+            </a:pPr>
+            <a:r>
+              <a:rPr lang="en-ZA" sz="1800" dirty="0"/>
+              <a:t>Gave input on the project </a:t>
+            </a:r>
+          </a:p>
+          <a:p>
+            <a:pPr lvl="3">
+              <a:buFont typeface="Arial" panose="020B0604020202020204" pitchFamily="34" charset="0"/>
+              <a:buChar char="•"/>
+            </a:pPr>
+            <a:r>
+              <a:rPr lang="en-ZA" sz="1800" dirty="0"/>
+              <a:t>Made  some suggestions like:</a:t>
+            </a:r>
+          </a:p>
+          <a:p>
+            <a:pPr lvl="4">
+              <a:buFont typeface="Arial" panose="020B0604020202020204" pitchFamily="34" charset="0"/>
+              <a:buChar char="•"/>
+            </a:pPr>
+            <a:r>
+              <a:rPr lang="en-ZA" sz="1700" dirty="0"/>
+              <a:t>Incorporating a graph showing hourly or 3-hourly, </a:t>
+            </a:r>
+            <a:r>
+              <a:rPr lang="en-ZA" sz="1700" dirty="0" err="1"/>
+              <a:t>etc</a:t>
+            </a:r>
+            <a:r>
+              <a:rPr lang="en-ZA" sz="1700" dirty="0"/>
+              <a:t> forecasts</a:t>
+            </a:r>
+          </a:p>
+          <a:p>
+            <a:pPr lvl="4">
+              <a:buFont typeface="Arial" panose="020B0604020202020204" pitchFamily="34" charset="0"/>
+              <a:buChar char="•"/>
+            </a:pPr>
+            <a:r>
+              <a:rPr lang="en-ZA" sz="1700" dirty="0"/>
+              <a:t>Use Social media data mining for disasters</a:t>
+            </a:r>
+          </a:p>
+          <a:p>
+            <a:endParaRPr lang="en-ZA" sz="1800" dirty="0"/>
+          </a:p>
+        </p:txBody>
+      </p:sp>
+    </p:spTree>
+    <p:extLst>
+      <p:ext uri="{BB962C8B-B14F-4D97-AF65-F5344CB8AC3E}">
+        <p14:creationId xmlns:p14="http://schemas.microsoft.com/office/powerpoint/2010/main" val="1959582406"/>
+      </p:ext>
+    </p:extLst>
+  </p:cSld>
+  <p:clrMapOvr>
+    <a:masterClrMapping/>
+  </p:clrMapOvr>
+</p:sld>
+</file>
+
+<file path=ppt/slides/slide7.xml><?xml version="1.0" encoding="utf-8"?>
+<p:sld xmlns:a="http://schemas.openxmlformats.org/drawingml/2006/main" xmlns:r="http://schemas.openxmlformats.org/officeDocument/2006/relationships" xmlns:p="http://schemas.openxmlformats.org/presentationml/2006/main">
+  <p:cSld>
+    <p:spTree>
+      <p:nvGrpSpPr>
+        <p:cNvPr id="1" name=""/>
+        <p:cNvGrpSpPr/>
+        <p:nvPr/>
+      </p:nvGrpSpPr>
+      <p:grpSpPr>
+        <a:xfrm>
+          <a:off x="0" y="0"/>
+          <a:ext cx="0" cy="0"/>
+          <a:chOff x="0" y="0"/>
+          <a:chExt cx="0" cy="0"/>
+        </a:xfrm>
+      </p:grpSpPr>
+      <p:sp>
+        <p:nvSpPr>
+          <p:cNvPr id="2" name="Title 1"/>
+          <p:cNvSpPr>
+            <a:spLocks noGrp="1"/>
+          </p:cNvSpPr>
+          <p:nvPr>
+            <p:ph type="title"/>
+          </p:nvPr>
+        </p:nvSpPr>
+        <p:spPr/>
+        <p:txBody>
+          <a:bodyPr/>
+          <a:lstStyle/>
+          <a:p>
+            <a:r>
+              <a:rPr lang="en-ZA" dirty="0"/>
+              <a:t>milestones</a:t>
+            </a:r>
+          </a:p>
+        </p:txBody>
+      </p:sp>
+      <p:sp>
+        <p:nvSpPr>
+          <p:cNvPr id="3" name="Content Placeholder 2"/>
+          <p:cNvSpPr>
+            <a:spLocks noGrp="1"/>
+          </p:cNvSpPr>
+          <p:nvPr>
+            <p:ph idx="1"/>
+          </p:nvPr>
+        </p:nvSpPr>
+        <p:spPr/>
+        <p:txBody>
+          <a:bodyPr/>
+          <a:lstStyle/>
+          <a:p>
+            <a:pPr lvl="1"/>
+            <a:r>
+              <a:rPr lang="en-ZA" sz="1800" dirty="0" smtClean="0"/>
+              <a:t>RC 1 </a:t>
+            </a:r>
+          </a:p>
+          <a:p>
+            <a:pPr lvl="2"/>
+            <a:r>
+              <a:rPr lang="en-ZA" sz="1800" dirty="0" smtClean="0"/>
+              <a:t>06 August 2016</a:t>
+            </a:r>
+          </a:p>
+          <a:p>
+            <a:pPr marL="0" lvl="1" indent="0">
+              <a:buNone/>
+            </a:pPr>
+            <a:endParaRPr lang="en-ZA" sz="1800" dirty="0" smtClean="0"/>
+          </a:p>
+          <a:p>
+            <a:pPr lvl="1"/>
+            <a:r>
+              <a:rPr lang="en-ZA" sz="1800" dirty="0" smtClean="0"/>
+              <a:t>RC 2</a:t>
+            </a:r>
+          </a:p>
+          <a:p>
+            <a:pPr lvl="2"/>
+            <a:r>
+              <a:rPr lang="en-ZA" sz="1800" dirty="0" smtClean="0"/>
+              <a:t>23 September 2016</a:t>
+            </a:r>
+          </a:p>
+          <a:p>
+            <a:pPr marL="0" lvl="1" indent="0">
+              <a:buNone/>
+            </a:pPr>
+            <a:endParaRPr lang="en-ZA" sz="1800" dirty="0" smtClean="0"/>
+          </a:p>
+          <a:p>
+            <a:pPr lvl="1"/>
+            <a:r>
+              <a:rPr lang="en-ZA" sz="1800" dirty="0" smtClean="0"/>
+              <a:t>FINAL RELEASE </a:t>
+            </a:r>
+          </a:p>
+          <a:p>
+            <a:pPr lvl="2"/>
+            <a:r>
+              <a:rPr lang="en-ZA" sz="1800" dirty="0" smtClean="0"/>
+              <a:t>13 October 2016</a:t>
+            </a:r>
+          </a:p>
+        </p:txBody>
+      </p:sp>
+    </p:spTree>
+    <p:extLst>
+      <p:ext uri="{BB962C8B-B14F-4D97-AF65-F5344CB8AC3E}">
+        <p14:creationId xmlns:p14="http://schemas.microsoft.com/office/powerpoint/2010/main" val="1595326472"/>
+      </p:ext>
+    </p:extLst>
+  </p:cSld>
+  <p:clrMapOvr>
+    <a:masterClrMapping/>
+  </p:clrMapOvr>
+</p:sld>
+</file>
+
+<file path=ppt/slides/slide8.xml><?xml version="1.0" encoding="utf-8"?>
+<p:sld xmlns:a="http://schemas.openxmlformats.org/drawingml/2006/main" xmlns:r="http://schemas.openxmlformats.org/officeDocument/2006/relationships" xmlns:p="http://schemas.openxmlformats.org/presentationml/2006/main">
+  <p:cSld>
+    <p:spTree>
+      <p:nvGrpSpPr>
+        <p:cNvPr id="1" name=""/>
+        <p:cNvGrpSpPr/>
+        <p:nvPr/>
+      </p:nvGrpSpPr>
+      <p:grpSpPr>
+        <a:xfrm>
+          <a:off x="0" y="0"/>
+          <a:ext cx="0" cy="0"/>
+          <a:chOff x="0" y="0"/>
+          <a:chExt cx="0" cy="0"/>
+        </a:xfrm>
+      </p:grpSpPr>
+      <p:sp>
+        <p:nvSpPr>
+          <p:cNvPr id="2" name="Title 1"/>
+          <p:cNvSpPr>
+            <a:spLocks noGrp="1"/>
+          </p:cNvSpPr>
+          <p:nvPr>
+            <p:ph type="title"/>
+          </p:nvPr>
+        </p:nvSpPr>
+        <p:spPr/>
+        <p:txBody>
+          <a:bodyPr/>
+          <a:lstStyle/>
+          <a:p>
+            <a:r>
+              <a:rPr lang="en-ZA" dirty="0"/>
+              <a:t>Working features</a:t>
+            </a:r>
+          </a:p>
+        </p:txBody>
+      </p:sp>
+      <p:sp>
+        <p:nvSpPr>
+          <p:cNvPr id="3" name="Text Placeholder 2"/>
+          <p:cNvSpPr>
+            <a:spLocks noGrp="1"/>
+          </p:cNvSpPr>
+          <p:nvPr>
+            <p:ph type="body" idx="1"/>
+          </p:nvPr>
+        </p:nvSpPr>
+        <p:spPr/>
+        <p:txBody>
+          <a:bodyPr/>
+          <a:lstStyle/>
+          <a:p>
+            <a:endParaRPr lang="en-ZA"/>
+          </a:p>
+        </p:txBody>
+      </p:sp>
+    </p:spTree>
+    <p:extLst>
+      <p:ext uri="{BB962C8B-B14F-4D97-AF65-F5344CB8AC3E}">
+        <p14:creationId xmlns:p14="http://schemas.microsoft.com/office/powerpoint/2010/main" val="2741913293"/>
+      </p:ext>
+    </p:extLst>
+  </p:cSld>
+  <p:clrMapOvr>
+    <a:masterClrMapping/>
+  </p:clrMapOvr>
 </p:sld>
 </file>
 

</xml_diff>

<commit_message>
Minor changes to presentation
</commit_message>
<xml_diff>
--- a/demos/Demo 2 - COEUS.pptx
+++ b/demos/Demo 2 - COEUS.pptx
@@ -510,11 +510,11 @@
           <c:showBubbleSize val="0"/>
         </c:dLbls>
         <c:smooth val="0"/>
-        <c:axId val="1043331808"/>
-        <c:axId val="1043335616"/>
+        <c:axId val="899949216"/>
+        <c:axId val="899951936"/>
       </c:lineChart>
       <c:catAx>
-        <c:axId val="1043331808"/>
+        <c:axId val="899949216"/>
         <c:scaling>
           <c:orientation val="minMax"/>
         </c:scaling>
@@ -557,7 +557,7 @@
             <a:endParaRPr lang="en-US"/>
           </a:p>
         </c:txPr>
-        <c:crossAx val="1043335616"/>
+        <c:crossAx val="899951936"/>
         <c:crosses val="autoZero"/>
         <c:auto val="1"/>
         <c:lblAlgn val="ctr"/>
@@ -565,7 +565,7 @@
         <c:noMultiLvlLbl val="0"/>
       </c:catAx>
       <c:valAx>
-        <c:axId val="1043335616"/>
+        <c:axId val="899951936"/>
         <c:scaling>
           <c:orientation val="minMax"/>
         </c:scaling>
@@ -672,7 +672,7 @@
             <a:endParaRPr lang="en-US"/>
           </a:p>
         </c:txPr>
-        <c:crossAx val="1043331808"/>
+        <c:crossAx val="899949216"/>
         <c:crosses val="autoZero"/>
         <c:crossBetween val="between"/>
       </c:valAx>
@@ -6157,8 +6157,13 @@
             </a:pPr>
             <a:r>
               <a:rPr lang="en-US" sz="2400" b="0" dirty="0"/>
-              <a:t>Scrum Meetings</a:t>
-            </a:r>
+              <a:t>Changes from previous </a:t>
+            </a:r>
+            <a:r>
+              <a:rPr lang="en-US" sz="2400" b="0" dirty="0" smtClean="0"/>
+              <a:t>demo</a:t>
+            </a:r>
+            <a:endParaRPr lang="en-US" sz="2400" b="0" dirty="0" smtClean="0"/>
           </a:p>
           <a:p>
             <a:pPr marL="285750" indent="-285750">
@@ -6166,8 +6171,12 @@
               <a:buChar char="•"/>
             </a:pPr>
             <a:r>
+              <a:rPr lang="en-US" sz="2400" b="0" dirty="0" smtClean="0"/>
+              <a:t>Scrum </a:t>
+            </a:r>
+            <a:r>
               <a:rPr lang="en-US" sz="2400" b="0" dirty="0"/>
-              <a:t>Changes from previous demo</a:t>
+              <a:t>Meetings</a:t>
             </a:r>
           </a:p>
           <a:p>
@@ -6176,8 +6185,12 @@
               <a:buChar char="•"/>
             </a:pPr>
             <a:r>
+              <a:rPr lang="en-US" sz="2400" b="0" dirty="0" smtClean="0"/>
+              <a:t>Client </a:t>
+            </a:r>
+            <a:r>
               <a:rPr lang="en-US" sz="2400" b="0" dirty="0"/>
-              <a:t>Client Meetings</a:t>
+              <a:t>Meetings</a:t>
             </a:r>
           </a:p>
           <a:p>
@@ -6256,8 +6269,13 @@
           <a:p>
             <a:r>
               <a:rPr lang="en-ZA" dirty="0"/>
-              <a:t>Changes from previous demo</a:t>
-            </a:r>
+              <a:t>Changes from previous </a:t>
+            </a:r>
+            <a:r>
+              <a:rPr lang="en-ZA" dirty="0" smtClean="0"/>
+              <a:t>demo and issues</a:t>
+            </a:r>
+            <a:endParaRPr lang="en-ZA" dirty="0"/>
           </a:p>
         </p:txBody>
       </p:sp>
@@ -6289,7 +6307,31 @@
             </a:pPr>
             <a:r>
               <a:rPr lang="en-ZA" sz="1800" dirty="0" smtClean="0"/>
-              <a:t>Technology Changes</a:t>
+              <a:t>Technology </a:t>
+            </a:r>
+            <a:r>
+              <a:rPr lang="en-ZA" sz="1800" dirty="0" smtClean="0"/>
+              <a:t>Changes</a:t>
+            </a:r>
+          </a:p>
+          <a:p>
+            <a:pPr>
+              <a:buFont typeface="Arial" panose="020B0604020202020204" pitchFamily="34" charset="0"/>
+              <a:buChar char="•"/>
+            </a:pPr>
+            <a:r>
+              <a:rPr lang="en-ZA" sz="1800" dirty="0" smtClean="0"/>
+              <a:t>Data sources</a:t>
+            </a:r>
+          </a:p>
+          <a:p>
+            <a:pPr>
+              <a:buFont typeface="Arial" panose="020B0604020202020204" pitchFamily="34" charset="0"/>
+              <a:buChar char="•"/>
+            </a:pPr>
+            <a:r>
+              <a:rPr lang="en-ZA" sz="1800" dirty="0" smtClean="0"/>
+              <a:t>Internet</a:t>
             </a:r>
             <a:endParaRPr lang="en-ZA" sz="1800" dirty="0"/>
           </a:p>

</xml_diff>